<commit_message>
add map of Sac County zip codes
</commit_message>
<xml_diff>
--- a/Project_1_Presentation.pptx
+++ b/Project_1_Presentation.pptx
@@ -9,6 +9,7 @@
     <p:sldId id="257" r:id="rId3"/>
     <p:sldId id="258" r:id="rId4"/>
     <p:sldId id="259" r:id="rId5"/>
+    <p:sldId id="260" r:id="rId6"/>
   </p:sldIdLst>
   <p:sldSz cx="12192000" cy="6858000"/>
   <p:notesSz cx="6858000" cy="9144000"/>
@@ -3574,9 +3575,12 @@
           </a:bodyPr>
           <a:lstStyle/>
           <a:p>
+            <a:pPr marL="0" indent="0">
+              <a:buNone/>
+            </a:pPr>
             <a:r>
               <a:rPr lang="en-US" dirty="0"/>
-              <a:t>We hypothesize that a decrease in the violent crime rate results in decreases in the poverty rate and an simultaneous increase in median income and median home prices. Our confidence level is 95% or a p-value of 0.05. We hypothesize that the p-value of these statistics in the neighborhood of Oak Park, zip codes 95817 and 95820, is statistically different from the rest of the population, which consists of Sacramento County(SAC). Our observed variables are the crime rate, poverty rate, income rate, and median home prices of Oak Park. Our expected values are the crime rate, poverty rate, income rate, and median home prices for SAC. Based upon the observed versus the expected values we can calculate the p-value. If the p-value is greater than 0.95 we will accept the hypothesis and test it out by applying it to the rest of SAC.</a:t>
+              <a:t>Our hypothesis is the following. We hypothesize that a decrease in the violent crime rate results in reductions in the poverty rate and a simultaneous increase in median income and median home prices. Our confidence level is 95% or a p-value of 0.05. We hypothesize that the p-value of these statistics in Oak Park, zip codes 95817 and 95820, is statistically different from Sacramento County. Our observed variables are the crime rate, poverty rate, income rate, and median home prices of Oak Park and Sacramento County. Our expected values are the crime rate, poverty rate, income rate, and median home prices for all of Sacramento County. Based on the observed versus the typical values, we can calculate the p-value. If the p-value is less than 0.05, we will accept the hypothesis. This analysis matters as police forces could use it to understand better where to assign resources.</a:t>
             </a:r>
           </a:p>
         </p:txBody>
@@ -3657,17 +3661,40 @@
         </p:nvSpPr>
         <p:spPr/>
         <p:txBody>
-          <a:bodyPr/>
+          <a:bodyPr>
+            <a:normAutofit/>
+          </a:bodyPr>
           <a:lstStyle/>
           <a:p>
             <a:r>
               <a:rPr lang="en-US" dirty="0"/>
-              <a:t>Crimes Against the Person: include Homicide, Mayhem, Kidnapping, Hostages, Robbery, Attempts to Kill, Assaults, False Imprisonment and Human Trafficking, and Assault </a:t>
-            </a:r>
-            <a:r>
-              <a:rPr lang="en-US"/>
-              <a:t>and Battery</a:t>
-            </a:r>
+              <a:t>“PC Personal”: refers to California Penal Code Crimes Against the Person which include Homicide, Mayhem, Kidnapping, Hostages, Robbery, Attempts to Kill, Assaults, False Imprisonment and Human Trafficking, and Assault and Battery.</a:t>
+            </a:r>
+          </a:p>
+          <a:p>
+            <a:r>
+              <a:rPr lang="en-US" dirty="0"/>
+              <a:t>“PC All”: refers to California Penal Code of all other types of crime including crimes against property, crimes against public justice, crimes against the person involving sexual assault, criminal threats, and miscellaneous crimes. </a:t>
+            </a:r>
+          </a:p>
+          <a:p>
+            <a:r>
+              <a:rPr lang="en-US" dirty="0"/>
+              <a:t>Additional information can be found here: </a:t>
+            </a:r>
+            <a:r>
+              <a:rPr lang="en-US" dirty="0">
+                <a:hlinkClick r:id="rId2"/>
+              </a:rPr>
+              <a:t>https://leginfo.legislature.ca.gov/</a:t>
+            </a:r>
+            <a:r>
+              <a:rPr lang="en-US" dirty="0"/>
+              <a:t> </a:t>
+            </a:r>
+          </a:p>
+          <a:p>
+            <a:endParaRPr lang="en-US" dirty="0"/>
           </a:p>
           <a:p>
             <a:endParaRPr lang="en-US" dirty="0"/>
@@ -3678,6 +3705,102 @@
     <p:extLst>
       <p:ext uri="{BB962C8B-B14F-4D97-AF65-F5344CB8AC3E}">
         <p14:creationId xmlns:p14="http://schemas.microsoft.com/office/powerpoint/2010/main" val="1897650247"/>
+      </p:ext>
+    </p:extLst>
+  </p:cSld>
+  <p:clrMapOvr>
+    <a:masterClrMapping/>
+  </p:clrMapOvr>
+</p:sld>
+</file>
+
+<file path=ppt/slides/slide5.xml><?xml version="1.0" encoding="utf-8"?>
+<p:sld xmlns:a="http://schemas.openxmlformats.org/drawingml/2006/main" xmlns:r="http://schemas.openxmlformats.org/officeDocument/2006/relationships" xmlns:p="http://schemas.openxmlformats.org/presentationml/2006/main">
+  <p:cSld>
+    <p:spTree>
+      <p:nvGrpSpPr>
+        <p:cNvPr id="1" name=""/>
+        <p:cNvGrpSpPr/>
+        <p:nvPr/>
+      </p:nvGrpSpPr>
+      <p:grpSpPr>
+        <a:xfrm>
+          <a:off x="0" y="0"/>
+          <a:ext cx="0" cy="0"/>
+          <a:chOff x="0" y="0"/>
+          <a:chExt cx="0" cy="0"/>
+        </a:xfrm>
+      </p:grpSpPr>
+      <p:sp>
+        <p:nvSpPr>
+          <p:cNvPr id="2" name="Title 1">
+            <a:extLst>
+              <a:ext uri="{FF2B5EF4-FFF2-40B4-BE49-F238E27FC236}">
+                <a16:creationId xmlns:a16="http://schemas.microsoft.com/office/drawing/2014/main" id="{965BE19F-7A99-ED47-AE18-076D3DB49216}"/>
+              </a:ext>
+            </a:extLst>
+          </p:cNvPr>
+          <p:cNvSpPr>
+            <a:spLocks noGrp="1"/>
+          </p:cNvSpPr>
+          <p:nvPr>
+            <p:ph type="title"/>
+          </p:nvPr>
+        </p:nvSpPr>
+        <p:spPr/>
+        <p:txBody>
+          <a:bodyPr/>
+          <a:lstStyle/>
+          <a:p>
+            <a:pPr algn="ctr"/>
+            <a:r>
+              <a:rPr lang="en-US" dirty="0"/>
+              <a:t>Sacramento County with Postal Zip Codes</a:t>
+            </a:r>
+          </a:p>
+        </p:txBody>
+      </p:sp>
+      <p:pic>
+        <p:nvPicPr>
+          <p:cNvPr id="5" name="Content Placeholder 4">
+            <a:extLst>
+              <a:ext uri="{FF2B5EF4-FFF2-40B4-BE49-F238E27FC236}">
+                <a16:creationId xmlns:a16="http://schemas.microsoft.com/office/drawing/2014/main" id="{8F47734C-90E9-2449-A9DC-60D9D3541E63}"/>
+              </a:ext>
+              <a:ext uri="{C183D7F6-B498-43B3-948B-1728B52AA6E4}">
+                <adec:decorative xmlns:adec="http://schemas.microsoft.com/office/drawing/2017/decorative" val="1"/>
+              </a:ext>
+            </a:extLst>
+          </p:cNvPr>
+          <p:cNvPicPr>
+            <a:picLocks noGrp="1" noChangeAspect="1"/>
+          </p:cNvPicPr>
+          <p:nvPr>
+            <p:ph idx="1"/>
+          </p:nvPr>
+        </p:nvPicPr>
+        <p:blipFill>
+          <a:blip r:embed="rId2"/>
+          <a:stretch>
+            <a:fillRect/>
+          </a:stretch>
+        </p:blipFill>
+        <p:spPr>
+          <a:xfrm>
+            <a:off x="3489434" y="1690688"/>
+            <a:ext cx="5213131" cy="4236967"/>
+          </a:xfrm>
+          <a:ln w="3175">
+            <a:solidFill>
+              <a:schemeClr val="tx1"/>
+            </a:solidFill>
+          </a:ln>
+        </p:spPr>
+      </p:pic>
+    </p:spTree>
+    <p:extLst>
+      <p:ext uri="{BB962C8B-B14F-4D97-AF65-F5344CB8AC3E}">
+        <p14:creationId xmlns:p14="http://schemas.microsoft.com/office/powerpoint/2010/main" val="3361318091"/>
       </p:ext>
     </p:extLst>
   </p:cSld>

</xml_diff>

<commit_message>
additional edits to deck
</commit_message>
<xml_diff>
--- a/Project_1_Presentation.pptx
+++ b/Project_1_Presentation.pptx
@@ -6,19 +6,22 @@
   </p:sldMasterIdLst>
   <p:sldIdLst>
     <p:sldId id="256" r:id="rId2"/>
-    <p:sldId id="258" r:id="rId3"/>
-    <p:sldId id="259" r:id="rId4"/>
-    <p:sldId id="260" r:id="rId5"/>
-    <p:sldId id="261" r:id="rId6"/>
-    <p:sldId id="263" r:id="rId7"/>
-    <p:sldId id="262" r:id="rId8"/>
-    <p:sldId id="264" r:id="rId9"/>
-    <p:sldId id="266" r:id="rId10"/>
-    <p:sldId id="269" r:id="rId11"/>
-    <p:sldId id="267" r:id="rId12"/>
-    <p:sldId id="270" r:id="rId13"/>
-    <p:sldId id="271" r:id="rId14"/>
-    <p:sldId id="272" r:id="rId15"/>
+    <p:sldId id="274" r:id="rId3"/>
+    <p:sldId id="275" r:id="rId4"/>
+    <p:sldId id="258" r:id="rId5"/>
+    <p:sldId id="259" r:id="rId6"/>
+    <p:sldId id="260" r:id="rId7"/>
+    <p:sldId id="261" r:id="rId8"/>
+    <p:sldId id="263" r:id="rId9"/>
+    <p:sldId id="262" r:id="rId10"/>
+    <p:sldId id="264" r:id="rId11"/>
+    <p:sldId id="266" r:id="rId12"/>
+    <p:sldId id="269" r:id="rId13"/>
+    <p:sldId id="267" r:id="rId14"/>
+    <p:sldId id="270" r:id="rId15"/>
+    <p:sldId id="271" r:id="rId16"/>
+    <p:sldId id="272" r:id="rId17"/>
+    <p:sldId id="273" r:id="rId18"/>
   </p:sldIdLst>
   <p:sldSz cx="12192000" cy="6858000"/>
   <p:notesSz cx="6858000" cy="9144000"/>
@@ -3439,10 +3442,10 @@
       </p:grpSpPr>
       <p:sp>
         <p:nvSpPr>
-          <p:cNvPr id="5" name="Title 4">
-            <a:extLst>
-              <a:ext uri="{FF2B5EF4-FFF2-40B4-BE49-F238E27FC236}">
-                <a16:creationId xmlns:a16="http://schemas.microsoft.com/office/drawing/2014/main" id="{2F7EE93D-E0F3-0B4F-9E0C-3904C99BEEDB}"/>
+          <p:cNvPr id="2" name="Title 1">
+            <a:extLst>
+              <a:ext uri="{FF2B5EF4-FFF2-40B4-BE49-F238E27FC236}">
+                <a16:creationId xmlns:a16="http://schemas.microsoft.com/office/drawing/2014/main" id="{8F4344C0-0B3B-B244-82D4-A5BA890AA477}"/>
               </a:ext>
             </a:extLst>
           </p:cNvPr>
@@ -3455,24 +3458,23 @@
         </p:nvSpPr>
         <p:spPr/>
         <p:txBody>
-          <a:bodyPr>
-            <a:normAutofit fontScale="90000"/>
-          </a:bodyPr>
-          <a:lstStyle/>
-          <a:p>
+          <a:bodyPr/>
+          <a:lstStyle/>
+          <a:p>
+            <a:pPr algn="ctr"/>
             <a:r>
               <a:rPr lang="en-US" dirty="0"/>
-              <a:t>Is there a correlation between the poverty rate and the crime rate?</a:t>
+              <a:t>A heat map of the crime rates reflects the same trend</a:t>
             </a:r>
           </a:p>
         </p:txBody>
       </p:sp>
       <p:pic>
         <p:nvPicPr>
-          <p:cNvPr id="13" name="Picture Placeholder 12" descr="Badge Question Mark">
-            <a:extLst>
-              <a:ext uri="{FF2B5EF4-FFF2-40B4-BE49-F238E27FC236}">
-                <a16:creationId xmlns:a16="http://schemas.microsoft.com/office/drawing/2014/main" id="{8A08F2A4-EE36-B643-8F47-901E07DB601A}"/>
+          <p:cNvPr id="6" name="Content Placeholder 5" descr="Map&#10;&#10;Description automatically generated">
+            <a:extLst>
+              <a:ext uri="{FF2B5EF4-FFF2-40B4-BE49-F238E27FC236}">
+                <a16:creationId xmlns:a16="http://schemas.microsoft.com/office/drawing/2014/main" id="{13804F86-FB8E-794B-85F9-8F8135423EBD}"/>
               </a:ext>
             </a:extLst>
           </p:cNvPr>
@@ -3480,59 +3482,125 @@
             <a:picLocks noGrp="1" noChangeAspect="1"/>
           </p:cNvPicPr>
           <p:nvPr>
-            <p:ph type="pic" idx="1"/>
+            <p:ph sz="half" idx="1"/>
           </p:nvPr>
         </p:nvPicPr>
         <p:blipFill>
-          <a:blip r:embed="rId2">
-            <a:extLst>
-              <a:ext uri="{96DAC541-7B7A-43D3-8B79-37D633B846F1}">
-                <asvg:svgBlip xmlns:asvg="http://schemas.microsoft.com/office/drawing/2016/SVG/main" r:embed="rId3"/>
-              </a:ext>
-            </a:extLst>
-          </a:blip>
-          <a:srcRect t="10520" b="10520"/>
+          <a:blip r:embed="rId2"/>
           <a:stretch>
             <a:fillRect/>
           </a:stretch>
         </p:blipFill>
-        <p:spPr/>
+        <p:spPr>
+          <a:xfrm>
+            <a:off x="1670050" y="2534444"/>
+            <a:ext cx="3517900" cy="2933700"/>
+          </a:xfrm>
+        </p:spPr>
       </p:pic>
-      <p:sp>
-        <p:nvSpPr>
-          <p:cNvPr id="7" name="Text Placeholder 6">
-            <a:extLst>
-              <a:ext uri="{FF2B5EF4-FFF2-40B4-BE49-F238E27FC236}">
-                <a16:creationId xmlns:a16="http://schemas.microsoft.com/office/drawing/2014/main" id="{55E3CBC9-A97D-8248-A63E-22ECABE825BF}"/>
-              </a:ext>
-            </a:extLst>
-          </p:cNvPr>
-          <p:cNvSpPr>
-            <a:spLocks noGrp="1"/>
-          </p:cNvSpPr>
-          <p:nvPr>
-            <p:ph type="body" sz="half" idx="2"/>
-          </p:nvPr>
-        </p:nvSpPr>
-        <p:spPr/>
-        <p:txBody>
-          <a:bodyPr/>
+      <p:pic>
+        <p:nvPicPr>
+          <p:cNvPr id="8" name="Content Placeholder 7" descr="Map&#10;&#10;Description automatically generated">
+            <a:extLst>
+              <a:ext uri="{FF2B5EF4-FFF2-40B4-BE49-F238E27FC236}">
+                <a16:creationId xmlns:a16="http://schemas.microsoft.com/office/drawing/2014/main" id="{FA8C7C05-E969-4347-BB79-BBF36C2C7E37}"/>
+              </a:ext>
+            </a:extLst>
+          </p:cNvPr>
+          <p:cNvPicPr>
+            <a:picLocks noGrp="1" noChangeAspect="1"/>
+          </p:cNvPicPr>
+          <p:nvPr>
+            <p:ph sz="half" idx="2"/>
+          </p:nvPr>
+        </p:nvPicPr>
+        <p:blipFill>
+          <a:blip r:embed="rId3"/>
+          <a:stretch>
+            <a:fillRect/>
+          </a:stretch>
+        </p:blipFill>
+        <p:spPr>
+          <a:xfrm>
+            <a:off x="6908800" y="2528094"/>
+            <a:ext cx="3708400" cy="2946400"/>
+          </a:xfrm>
+        </p:spPr>
+      </p:pic>
+      <p:sp>
+        <p:nvSpPr>
+          <p:cNvPr id="9" name="TextBox 8">
+            <a:extLst>
+              <a:ext uri="{FF2B5EF4-FFF2-40B4-BE49-F238E27FC236}">
+                <a16:creationId xmlns:a16="http://schemas.microsoft.com/office/drawing/2014/main" id="{A7C4F9BA-2BEF-ED44-ADC2-4D6B05EA71EE}"/>
+              </a:ext>
+            </a:extLst>
+          </p:cNvPr>
+          <p:cNvSpPr txBox="1"/>
+          <p:nvPr/>
+        </p:nvSpPr>
+        <p:spPr>
+          <a:xfrm>
+            <a:off x="2900856" y="2175641"/>
+            <a:ext cx="710248" cy="369332"/>
+          </a:xfrm>
+          <a:prstGeom prst="rect">
+            <a:avLst/>
+          </a:prstGeom>
+          <a:noFill/>
+        </p:spPr>
+        <p:txBody>
+          <a:bodyPr wrap="square" rtlCol="0">
+            <a:spAutoFit/>
+          </a:bodyPr>
           <a:lstStyle/>
           <a:p>
             <a:r>
               <a:rPr lang="en-US" dirty="0"/>
-              <a:t>Our hypothesis is that as the poverty rate goes up, the crime rate goes up.</a:t>
-            </a:r>
-          </a:p>
-          <a:p>
-            <a:endParaRPr lang="en-US" dirty="0"/>
+              <a:t>2014</a:t>
+            </a:r>
+          </a:p>
+        </p:txBody>
+      </p:sp>
+      <p:sp>
+        <p:nvSpPr>
+          <p:cNvPr id="10" name="TextBox 9">
+            <a:extLst>
+              <a:ext uri="{FF2B5EF4-FFF2-40B4-BE49-F238E27FC236}">
+                <a16:creationId xmlns:a16="http://schemas.microsoft.com/office/drawing/2014/main" id="{96CC2537-573E-B943-8BC9-AEC11C2DF258}"/>
+              </a:ext>
+            </a:extLst>
+          </p:cNvPr>
+          <p:cNvSpPr txBox="1"/>
+          <p:nvPr/>
+        </p:nvSpPr>
+        <p:spPr>
+          <a:xfrm>
+            <a:off x="8485646" y="2158762"/>
+            <a:ext cx="805498" cy="369332"/>
+          </a:xfrm>
+          <a:prstGeom prst="rect">
+            <a:avLst/>
+          </a:prstGeom>
+          <a:noFill/>
+        </p:spPr>
+        <p:txBody>
+          <a:bodyPr wrap="square" rtlCol="0">
+            <a:spAutoFit/>
+          </a:bodyPr>
+          <a:lstStyle/>
+          <a:p>
+            <a:r>
+              <a:rPr lang="en-US" dirty="0"/>
+              <a:t>2018</a:t>
+            </a:r>
           </a:p>
         </p:txBody>
       </p:sp>
     </p:spTree>
     <p:extLst>
       <p:ext uri="{BB962C8B-B14F-4D97-AF65-F5344CB8AC3E}">
-        <p14:creationId xmlns:p14="http://schemas.microsoft.com/office/powerpoint/2010/main" val="3443678674"/>
+        <p14:creationId xmlns:p14="http://schemas.microsoft.com/office/powerpoint/2010/main" val="1175564477"/>
       </p:ext>
     </p:extLst>
   </p:cSld>
@@ -3564,7 +3632,7 @@
           <p:cNvPr id="2" name="Title 1">
             <a:extLst>
               <a:ext uri="{FF2B5EF4-FFF2-40B4-BE49-F238E27FC236}">
-                <a16:creationId xmlns:a16="http://schemas.microsoft.com/office/drawing/2014/main" id="{B3E589FB-21B9-AB44-864C-0C2CCB168BC9}"/>
+                <a16:creationId xmlns:a16="http://schemas.microsoft.com/office/drawing/2014/main" id="{01C8E1F2-0055-FD49-804A-DD484BE3E1C0}"/>
               </a:ext>
             </a:extLst>
           </p:cNvPr>
@@ -3583,17 +3651,17 @@
             <a:pPr algn="ctr"/>
             <a:r>
               <a:rPr lang="en-US" dirty="0"/>
-              <a:t>Sacramento County </a:t>
+              <a:t>An outlier in the data was identified, additional analysis confirmed it</a:t>
             </a:r>
           </a:p>
         </p:txBody>
       </p:sp>
       <p:pic>
         <p:nvPicPr>
-          <p:cNvPr id="6" name="Content Placeholder 5" descr="Chart, scatter chart&#10;&#10;Description automatically generated">
-            <a:extLst>
-              <a:ext uri="{FF2B5EF4-FFF2-40B4-BE49-F238E27FC236}">
-                <a16:creationId xmlns:a16="http://schemas.microsoft.com/office/drawing/2014/main" id="{B7197AEC-0450-B140-9E94-A5CBC5207FCF}"/>
+          <p:cNvPr id="6" name="Content Placeholder 5" descr="Chart, box and whisker chart&#10;&#10;Description automatically generated">
+            <a:extLst>
+              <a:ext uri="{FF2B5EF4-FFF2-40B4-BE49-F238E27FC236}">
+                <a16:creationId xmlns:a16="http://schemas.microsoft.com/office/drawing/2014/main" id="{6F4B9DB2-01AB-1A4E-9E0A-A0B527B1DEAB}"/>
               </a:ext>
             </a:extLst>
           </p:cNvPr>
@@ -3619,10 +3687,10 @@
       </p:pic>
       <p:pic>
         <p:nvPicPr>
-          <p:cNvPr id="8" name="Content Placeholder 7" descr="Chart, scatter chart&#10;&#10;Description automatically generated">
-            <a:extLst>
-              <a:ext uri="{FF2B5EF4-FFF2-40B4-BE49-F238E27FC236}">
-                <a16:creationId xmlns:a16="http://schemas.microsoft.com/office/drawing/2014/main" id="{52C72A5B-0B5B-4E44-830D-75823A12BEB4}"/>
+          <p:cNvPr id="8" name="Content Placeholder 7" descr="Chart&#10;&#10;Description automatically generated">
+            <a:extLst>
+              <a:ext uri="{FF2B5EF4-FFF2-40B4-BE49-F238E27FC236}">
+                <a16:creationId xmlns:a16="http://schemas.microsoft.com/office/drawing/2014/main" id="{3748B96D-1DE4-504B-ADD6-E9E08005F6F6}"/>
               </a:ext>
             </a:extLst>
           </p:cNvPr>
@@ -3641,17 +3709,17 @@
         </p:blipFill>
         <p:spPr>
           <a:xfrm>
-            <a:off x="6172200" y="2274094"/>
-            <a:ext cx="5181600" cy="3454400"/>
+            <a:off x="6172200" y="2364828"/>
+            <a:ext cx="5181600" cy="3258206"/>
           </a:xfrm>
         </p:spPr>
       </p:pic>
       <p:sp>
         <p:nvSpPr>
-          <p:cNvPr id="10" name="TextBox 9">
-            <a:extLst>
-              <a:ext uri="{FF2B5EF4-FFF2-40B4-BE49-F238E27FC236}">
-                <a16:creationId xmlns:a16="http://schemas.microsoft.com/office/drawing/2014/main" id="{B1BB0B7B-C619-AA49-9400-EB962F819779}"/>
+          <p:cNvPr id="9" name="TextBox 8">
+            <a:extLst>
+              <a:ext uri="{FF2B5EF4-FFF2-40B4-BE49-F238E27FC236}">
+                <a16:creationId xmlns:a16="http://schemas.microsoft.com/office/drawing/2014/main" id="{163B2049-67BD-B34D-8291-38417482DE9F}"/>
               </a:ext>
             </a:extLst>
           </p:cNvPr>
@@ -3660,8 +3728,8 @@
         </p:nvSpPr>
         <p:spPr>
           <a:xfrm>
-            <a:off x="1495167" y="5832388"/>
-            <a:ext cx="9341709" cy="861774"/>
+            <a:off x="1481959" y="5728494"/>
+            <a:ext cx="9427779" cy="646331"/>
           </a:xfrm>
           <a:prstGeom prst="rect">
             <a:avLst/>
@@ -3674,20 +3742,18 @@
           </a:bodyPr>
           <a:lstStyle/>
           <a:p>
-            <a:r>
-              <a:rPr lang="en-US" sz="1600" dirty="0"/>
-              <a:t>The average p-value is 0.02 and the average r-square value is 0.12. Given these values and the diagrams’ appearance, our hypothesis is confirmed.</a:t>
-            </a:r>
-          </a:p>
-          <a:p>
-            <a:endParaRPr lang="en-US" dirty="0"/>
+            <a:pPr algn="ctr"/>
+            <a:r>
+              <a:rPr lang="en-US" dirty="0"/>
+              <a:t>The bar graph above clearly illustrates we have an outlier, 95837. The zip code was removed from further analysis as it threw off subsequent calculations.</a:t>
+            </a:r>
           </a:p>
         </p:txBody>
       </p:sp>
     </p:spTree>
     <p:extLst>
       <p:ext uri="{BB962C8B-B14F-4D97-AF65-F5344CB8AC3E}">
-        <p14:creationId xmlns:p14="http://schemas.microsoft.com/office/powerpoint/2010/main" val="3639500199"/>
+        <p14:creationId xmlns:p14="http://schemas.microsoft.com/office/powerpoint/2010/main" val="938042992"/>
       </p:ext>
     </p:extLst>
   </p:cSld>
@@ -3719,7 +3785,7 @@
           <p:cNvPr id="5" name="Title 4">
             <a:extLst>
               <a:ext uri="{FF2B5EF4-FFF2-40B4-BE49-F238E27FC236}">
-                <a16:creationId xmlns:a16="http://schemas.microsoft.com/office/drawing/2014/main" id="{FB4B6351-2F76-4647-9450-AF9B37B27325}"/>
+                <a16:creationId xmlns:a16="http://schemas.microsoft.com/office/drawing/2014/main" id="{2F7EE93D-E0F3-0B4F-9E0C-3904C99BEEDB}"/>
               </a:ext>
             </a:extLst>
           </p:cNvPr>
@@ -3732,23 +3798,24 @@
         </p:nvSpPr>
         <p:spPr/>
         <p:txBody>
-          <a:bodyPr/>
-          <a:lstStyle/>
-          <a:p>
-            <a:pPr algn="ctr"/>
+          <a:bodyPr>
+            <a:normAutofit fontScale="90000"/>
+          </a:bodyPr>
+          <a:lstStyle/>
+          <a:p>
             <a:r>
               <a:rPr lang="en-US" dirty="0"/>
-              <a:t>Oak Park </a:t>
+              <a:t>Is there a correlation between the poverty rate and the crime rate?</a:t>
             </a:r>
           </a:p>
         </p:txBody>
       </p:sp>
       <p:pic>
         <p:nvPicPr>
-          <p:cNvPr id="12" name="Content Placeholder 11" descr="Chart, scatter chart&#10;&#10;Description automatically generated">
-            <a:extLst>
-              <a:ext uri="{FF2B5EF4-FFF2-40B4-BE49-F238E27FC236}">
-                <a16:creationId xmlns:a16="http://schemas.microsoft.com/office/drawing/2014/main" id="{293A37EA-EE72-3844-A1BF-266B88C9A796}"/>
+          <p:cNvPr id="13" name="Picture Placeholder 12" descr="Badge Question Mark">
+            <a:extLst>
+              <a:ext uri="{FF2B5EF4-FFF2-40B4-BE49-F238E27FC236}">
+                <a16:creationId xmlns:a16="http://schemas.microsoft.com/office/drawing/2014/main" id="{8A08F2A4-EE36-B643-8F47-901E07DB601A}"/>
               </a:ext>
             </a:extLst>
           </p:cNvPr>
@@ -3756,53 +3823,48 @@
             <a:picLocks noGrp="1" noChangeAspect="1"/>
           </p:cNvPicPr>
           <p:nvPr>
-            <p:ph idx="1"/>
+            <p:ph type="pic" idx="1"/>
           </p:nvPr>
         </p:nvPicPr>
         <p:blipFill>
-          <a:blip r:embed="rId2"/>
+          <a:blip r:embed="rId2">
+            <a:extLst>
+              <a:ext uri="{96DAC541-7B7A-43D3-8B79-37D633B846F1}">
+                <asvg:svgBlip xmlns:asvg="http://schemas.microsoft.com/office/drawing/2016/SVG/main" r:embed="rId3"/>
+              </a:ext>
+            </a:extLst>
+          </a:blip>
+          <a:srcRect t="10520" b="10520"/>
           <a:stretch>
             <a:fillRect/>
           </a:stretch>
         </p:blipFill>
-        <p:spPr>
-          <a:xfrm>
-            <a:off x="3352800" y="2172494"/>
-            <a:ext cx="5486400" cy="3657600"/>
-          </a:xfrm>
-        </p:spPr>
+        <p:spPr/>
       </p:pic>
       <p:sp>
         <p:nvSpPr>
-          <p:cNvPr id="13" name="TextBox 12">
-            <a:extLst>
-              <a:ext uri="{FF2B5EF4-FFF2-40B4-BE49-F238E27FC236}">
-                <a16:creationId xmlns:a16="http://schemas.microsoft.com/office/drawing/2014/main" id="{4697160B-8F48-8C4C-B3C0-4FFB87B30981}"/>
-              </a:ext>
-            </a:extLst>
-          </p:cNvPr>
-          <p:cNvSpPr txBox="1"/>
-          <p:nvPr/>
-        </p:nvSpPr>
-        <p:spPr>
-          <a:xfrm>
-            <a:off x="1692165" y="5850235"/>
-            <a:ext cx="9112469" cy="923330"/>
-          </a:xfrm>
-          <a:prstGeom prst="rect">
-            <a:avLst/>
-          </a:prstGeom>
-          <a:noFill/>
-        </p:spPr>
-        <p:txBody>
-          <a:bodyPr wrap="square" rtlCol="0">
-            <a:spAutoFit/>
-          </a:bodyPr>
+          <p:cNvPr id="7" name="Text Placeholder 6">
+            <a:extLst>
+              <a:ext uri="{FF2B5EF4-FFF2-40B4-BE49-F238E27FC236}">
+                <a16:creationId xmlns:a16="http://schemas.microsoft.com/office/drawing/2014/main" id="{55E3CBC9-A97D-8248-A63E-22ECABE825BF}"/>
+              </a:ext>
+            </a:extLst>
+          </p:cNvPr>
+          <p:cNvSpPr>
+            <a:spLocks noGrp="1"/>
+          </p:cNvSpPr>
+          <p:nvPr>
+            <p:ph type="body" sz="half" idx="2"/>
+          </p:nvPr>
+        </p:nvSpPr>
+        <p:spPr/>
+        <p:txBody>
+          <a:bodyPr/>
           <a:lstStyle/>
           <a:p>
             <a:r>
               <a:rPr lang="en-US" dirty="0"/>
-              <a:t>The p-value is 0.23 and the r-square value is 0.16. Given these values and the diagrams’ appearance, we conclude that Oak Park goes against the overall trend in Sacramento County. </a:t>
+              <a:t>Our hypothesis is that as the poverty rate goes up, the crime rate goes up.</a:t>
             </a:r>
           </a:p>
           <a:p>
@@ -3813,7 +3875,7 @@
     </p:spTree>
     <p:extLst>
       <p:ext uri="{BB962C8B-B14F-4D97-AF65-F5344CB8AC3E}">
-        <p14:creationId xmlns:p14="http://schemas.microsoft.com/office/powerpoint/2010/main" val="4206593396"/>
+        <p14:creationId xmlns:p14="http://schemas.microsoft.com/office/powerpoint/2010/main" val="3443678674"/>
       </p:ext>
     </p:extLst>
   </p:cSld>
@@ -3845,7 +3907,7 @@
           <p:cNvPr id="2" name="Title 1">
             <a:extLst>
               <a:ext uri="{FF2B5EF4-FFF2-40B4-BE49-F238E27FC236}">
-                <a16:creationId xmlns:a16="http://schemas.microsoft.com/office/drawing/2014/main" id="{14A65B19-F916-A34F-AE6F-80296158A5C4}"/>
+                <a16:creationId xmlns:a16="http://schemas.microsoft.com/office/drawing/2014/main" id="{B3E589FB-21B9-AB44-864C-0C2CCB168BC9}"/>
               </a:ext>
             </a:extLst>
           </p:cNvPr>
@@ -3864,17 +3926,17 @@
             <a:pPr algn="ctr"/>
             <a:r>
               <a:rPr lang="en-US" dirty="0"/>
-              <a:t>Crime Rate vs. Median Home Values in Sacramento County for 2014-2018</a:t>
+              <a:t>Sacramento County </a:t>
             </a:r>
           </a:p>
         </p:txBody>
       </p:sp>
       <p:pic>
         <p:nvPicPr>
-          <p:cNvPr id="17" name="Content Placeholder 16" descr="Chart, scatter chart&#10;&#10;Description automatically generated">
-            <a:extLst>
-              <a:ext uri="{FF2B5EF4-FFF2-40B4-BE49-F238E27FC236}">
-                <a16:creationId xmlns:a16="http://schemas.microsoft.com/office/drawing/2014/main" id="{9773D26D-9102-9042-8DCB-1E8F87070936}"/>
+          <p:cNvPr id="6" name="Content Placeholder 5" descr="Chart, scatter chart&#10;&#10;Description automatically generated">
+            <a:extLst>
+              <a:ext uri="{FF2B5EF4-FFF2-40B4-BE49-F238E27FC236}">
+                <a16:creationId xmlns:a16="http://schemas.microsoft.com/office/drawing/2014/main" id="{B7197AEC-0450-B140-9E94-A5CBC5207FCF}"/>
               </a:ext>
             </a:extLst>
           </p:cNvPr>
@@ -3900,10 +3962,10 @@
       </p:pic>
       <p:pic>
         <p:nvPicPr>
-          <p:cNvPr id="19" name="Content Placeholder 18" descr="Chart, scatter chart&#10;&#10;Description automatically generated">
-            <a:extLst>
-              <a:ext uri="{FF2B5EF4-FFF2-40B4-BE49-F238E27FC236}">
-                <a16:creationId xmlns:a16="http://schemas.microsoft.com/office/drawing/2014/main" id="{D3703BF8-BD70-DC4B-AE4E-87D90FE0947A}"/>
+          <p:cNvPr id="8" name="Content Placeholder 7" descr="Chart, scatter chart&#10;&#10;Description automatically generated">
+            <a:extLst>
+              <a:ext uri="{FF2B5EF4-FFF2-40B4-BE49-F238E27FC236}">
+                <a16:creationId xmlns:a16="http://schemas.microsoft.com/office/drawing/2014/main" id="{52C72A5B-0B5B-4E44-830D-75823A12BEB4}"/>
               </a:ext>
             </a:extLst>
           </p:cNvPr>
@@ -3929,10 +3991,10 @@
       </p:pic>
       <p:sp>
         <p:nvSpPr>
-          <p:cNvPr id="22" name="TextBox 21">
-            <a:extLst>
-              <a:ext uri="{FF2B5EF4-FFF2-40B4-BE49-F238E27FC236}">
-                <a16:creationId xmlns:a16="http://schemas.microsoft.com/office/drawing/2014/main" id="{98334412-A37A-8D45-BC60-6FDB2E80CF4C}"/>
+          <p:cNvPr id="10" name="TextBox 9">
+            <a:extLst>
+              <a:ext uri="{FF2B5EF4-FFF2-40B4-BE49-F238E27FC236}">
+                <a16:creationId xmlns:a16="http://schemas.microsoft.com/office/drawing/2014/main" id="{B1BB0B7B-C619-AA49-9400-EB962F819779}"/>
               </a:ext>
             </a:extLst>
           </p:cNvPr>
@@ -3941,8 +4003,8 @@
         </p:nvSpPr>
         <p:spPr>
           <a:xfrm>
-            <a:off x="1450428" y="5927834"/>
-            <a:ext cx="9438289" cy="923330"/>
+            <a:off x="1495167" y="5832388"/>
+            <a:ext cx="9341709" cy="861774"/>
           </a:xfrm>
           <a:prstGeom prst="rect">
             <a:avLst/>
@@ -3956,16 +4018,19 @@
           <a:lstStyle/>
           <a:p>
             <a:r>
-              <a:rPr lang="en-US" dirty="0"/>
-              <a:t>The average p-value is 0.01 and the average r-square value is 0.15. Given these values and the diagrams’ appearance, our hypothesis, which is that as median home values increase the crime rate decreases, is confirmed.</a:t>
-            </a:r>
+              <a:rPr lang="en-US" sz="1600" dirty="0"/>
+              <a:t>The average p-value is 0.02 and the average r-square value is 0.12. Given these values and the diagrams’ appearance, our hypothesis is confirmed.</a:t>
+            </a:r>
+          </a:p>
+          <a:p>
+            <a:endParaRPr lang="en-US" dirty="0"/>
           </a:p>
         </p:txBody>
       </p:sp>
     </p:spTree>
     <p:extLst>
       <p:ext uri="{BB962C8B-B14F-4D97-AF65-F5344CB8AC3E}">
-        <p14:creationId xmlns:p14="http://schemas.microsoft.com/office/powerpoint/2010/main" val="3994172782"/>
+        <p14:creationId xmlns:p14="http://schemas.microsoft.com/office/powerpoint/2010/main" val="3639500199"/>
       </p:ext>
     </p:extLst>
   </p:cSld>
@@ -3997,7 +4062,7 @@
           <p:cNvPr id="5" name="Title 4">
             <a:extLst>
               <a:ext uri="{FF2B5EF4-FFF2-40B4-BE49-F238E27FC236}">
-                <a16:creationId xmlns:a16="http://schemas.microsoft.com/office/drawing/2014/main" id="{424BE359-D8FA-C14D-BD59-8461CEAC087F}"/>
+                <a16:creationId xmlns:a16="http://schemas.microsoft.com/office/drawing/2014/main" id="{FB4B6351-2F76-4647-9450-AF9B37B27325}"/>
               </a:ext>
             </a:extLst>
           </p:cNvPr>
@@ -4016,17 +4081,17 @@
             <a:pPr algn="ctr"/>
             <a:r>
               <a:rPr lang="en-US" dirty="0"/>
-              <a:t>Crime Rate vs. Median Home Values in Oak Park for 2014-2018</a:t>
+              <a:t>Oak Park </a:t>
             </a:r>
           </a:p>
         </p:txBody>
       </p:sp>
       <p:pic>
         <p:nvPicPr>
-          <p:cNvPr id="8" name="Content Placeholder 7" descr="Chart, scatter chart&#10;&#10;Description automatically generated">
-            <a:extLst>
-              <a:ext uri="{FF2B5EF4-FFF2-40B4-BE49-F238E27FC236}">
-                <a16:creationId xmlns:a16="http://schemas.microsoft.com/office/drawing/2014/main" id="{EA48A08C-41D2-2646-AA7D-4219B521BDAA}"/>
+          <p:cNvPr id="12" name="Content Placeholder 11" descr="Chart, scatter chart&#10;&#10;Description automatically generated">
+            <a:extLst>
+              <a:ext uri="{FF2B5EF4-FFF2-40B4-BE49-F238E27FC236}">
+                <a16:creationId xmlns:a16="http://schemas.microsoft.com/office/drawing/2014/main" id="{293A37EA-EE72-3844-A1BF-266B88C9A796}"/>
               </a:ext>
             </a:extLst>
           </p:cNvPr>
@@ -4052,6 +4117,284 @@
       </p:pic>
       <p:sp>
         <p:nvSpPr>
+          <p:cNvPr id="13" name="TextBox 12">
+            <a:extLst>
+              <a:ext uri="{FF2B5EF4-FFF2-40B4-BE49-F238E27FC236}">
+                <a16:creationId xmlns:a16="http://schemas.microsoft.com/office/drawing/2014/main" id="{4697160B-8F48-8C4C-B3C0-4FFB87B30981}"/>
+              </a:ext>
+            </a:extLst>
+          </p:cNvPr>
+          <p:cNvSpPr txBox="1"/>
+          <p:nvPr/>
+        </p:nvSpPr>
+        <p:spPr>
+          <a:xfrm>
+            <a:off x="1692165" y="5850235"/>
+            <a:ext cx="9112469" cy="923330"/>
+          </a:xfrm>
+          <a:prstGeom prst="rect">
+            <a:avLst/>
+          </a:prstGeom>
+          <a:noFill/>
+        </p:spPr>
+        <p:txBody>
+          <a:bodyPr wrap="square" rtlCol="0">
+            <a:spAutoFit/>
+          </a:bodyPr>
+          <a:lstStyle/>
+          <a:p>
+            <a:r>
+              <a:rPr lang="en-US" dirty="0"/>
+              <a:t>The p-value is 0.23 and the r-square value is 0.16. Given these values and the diagrams’ appearance, we conclude that Oak Park goes against the overall trend in Sacramento County. </a:t>
+            </a:r>
+          </a:p>
+          <a:p>
+            <a:endParaRPr lang="en-US" dirty="0"/>
+          </a:p>
+        </p:txBody>
+      </p:sp>
+    </p:spTree>
+    <p:extLst>
+      <p:ext uri="{BB962C8B-B14F-4D97-AF65-F5344CB8AC3E}">
+        <p14:creationId xmlns:p14="http://schemas.microsoft.com/office/powerpoint/2010/main" val="4206593396"/>
+      </p:ext>
+    </p:extLst>
+  </p:cSld>
+  <p:clrMapOvr>
+    <a:masterClrMapping/>
+  </p:clrMapOvr>
+</p:sld>
+</file>
+
+<file path=ppt/slides/slide15.xml><?xml version="1.0" encoding="utf-8"?>
+<p:sld xmlns:a="http://schemas.openxmlformats.org/drawingml/2006/main" xmlns:r="http://schemas.openxmlformats.org/officeDocument/2006/relationships" xmlns:p="http://schemas.openxmlformats.org/presentationml/2006/main">
+  <p:cSld>
+    <p:spTree>
+      <p:nvGrpSpPr>
+        <p:cNvPr id="1" name=""/>
+        <p:cNvGrpSpPr/>
+        <p:nvPr/>
+      </p:nvGrpSpPr>
+      <p:grpSpPr>
+        <a:xfrm>
+          <a:off x="0" y="0"/>
+          <a:ext cx="0" cy="0"/>
+          <a:chOff x="0" y="0"/>
+          <a:chExt cx="0" cy="0"/>
+        </a:xfrm>
+      </p:grpSpPr>
+      <p:sp>
+        <p:nvSpPr>
+          <p:cNvPr id="2" name="Title 1">
+            <a:extLst>
+              <a:ext uri="{FF2B5EF4-FFF2-40B4-BE49-F238E27FC236}">
+                <a16:creationId xmlns:a16="http://schemas.microsoft.com/office/drawing/2014/main" id="{14A65B19-F916-A34F-AE6F-80296158A5C4}"/>
+              </a:ext>
+            </a:extLst>
+          </p:cNvPr>
+          <p:cNvSpPr>
+            <a:spLocks noGrp="1"/>
+          </p:cNvSpPr>
+          <p:nvPr>
+            <p:ph type="title"/>
+          </p:nvPr>
+        </p:nvSpPr>
+        <p:spPr/>
+        <p:txBody>
+          <a:bodyPr/>
+          <a:lstStyle/>
+          <a:p>
+            <a:pPr algn="ctr"/>
+            <a:r>
+              <a:rPr lang="en-US" dirty="0"/>
+              <a:t>Crime Rate vs. Median Home Values in Sacramento County for 2014-2018</a:t>
+            </a:r>
+          </a:p>
+        </p:txBody>
+      </p:sp>
+      <p:pic>
+        <p:nvPicPr>
+          <p:cNvPr id="17" name="Content Placeholder 16" descr="Chart, scatter chart&#10;&#10;Description automatically generated">
+            <a:extLst>
+              <a:ext uri="{FF2B5EF4-FFF2-40B4-BE49-F238E27FC236}">
+                <a16:creationId xmlns:a16="http://schemas.microsoft.com/office/drawing/2014/main" id="{9773D26D-9102-9042-8DCB-1E8F87070936}"/>
+              </a:ext>
+            </a:extLst>
+          </p:cNvPr>
+          <p:cNvPicPr>
+            <a:picLocks noGrp="1" noChangeAspect="1"/>
+          </p:cNvPicPr>
+          <p:nvPr>
+            <p:ph sz="half" idx="1"/>
+          </p:nvPr>
+        </p:nvPicPr>
+        <p:blipFill>
+          <a:blip r:embed="rId2"/>
+          <a:stretch>
+            <a:fillRect/>
+          </a:stretch>
+        </p:blipFill>
+        <p:spPr>
+          <a:xfrm>
+            <a:off x="838200" y="2274094"/>
+            <a:ext cx="5181600" cy="3454400"/>
+          </a:xfrm>
+        </p:spPr>
+      </p:pic>
+      <p:pic>
+        <p:nvPicPr>
+          <p:cNvPr id="19" name="Content Placeholder 18" descr="Chart, scatter chart&#10;&#10;Description automatically generated">
+            <a:extLst>
+              <a:ext uri="{FF2B5EF4-FFF2-40B4-BE49-F238E27FC236}">
+                <a16:creationId xmlns:a16="http://schemas.microsoft.com/office/drawing/2014/main" id="{D3703BF8-BD70-DC4B-AE4E-87D90FE0947A}"/>
+              </a:ext>
+            </a:extLst>
+          </p:cNvPr>
+          <p:cNvPicPr>
+            <a:picLocks noGrp="1" noChangeAspect="1"/>
+          </p:cNvPicPr>
+          <p:nvPr>
+            <p:ph sz="half" idx="2"/>
+          </p:nvPr>
+        </p:nvPicPr>
+        <p:blipFill>
+          <a:blip r:embed="rId3"/>
+          <a:stretch>
+            <a:fillRect/>
+          </a:stretch>
+        </p:blipFill>
+        <p:spPr>
+          <a:xfrm>
+            <a:off x="6172200" y="2274094"/>
+            <a:ext cx="5181600" cy="3454400"/>
+          </a:xfrm>
+        </p:spPr>
+      </p:pic>
+      <p:sp>
+        <p:nvSpPr>
+          <p:cNvPr id="22" name="TextBox 21">
+            <a:extLst>
+              <a:ext uri="{FF2B5EF4-FFF2-40B4-BE49-F238E27FC236}">
+                <a16:creationId xmlns:a16="http://schemas.microsoft.com/office/drawing/2014/main" id="{98334412-A37A-8D45-BC60-6FDB2E80CF4C}"/>
+              </a:ext>
+            </a:extLst>
+          </p:cNvPr>
+          <p:cNvSpPr txBox="1"/>
+          <p:nvPr/>
+        </p:nvSpPr>
+        <p:spPr>
+          <a:xfrm>
+            <a:off x="1450428" y="5927834"/>
+            <a:ext cx="9438289" cy="923330"/>
+          </a:xfrm>
+          <a:prstGeom prst="rect">
+            <a:avLst/>
+          </a:prstGeom>
+          <a:noFill/>
+        </p:spPr>
+        <p:txBody>
+          <a:bodyPr wrap="square" rtlCol="0">
+            <a:spAutoFit/>
+          </a:bodyPr>
+          <a:lstStyle/>
+          <a:p>
+            <a:r>
+              <a:rPr lang="en-US" dirty="0"/>
+              <a:t>The average p-value is 0.01 and the average r-square value is 0.15. Given these values and the diagrams’ appearance, our hypothesis, which is that as median home values increase the crime rate decreases, is confirmed.</a:t>
+            </a:r>
+          </a:p>
+        </p:txBody>
+      </p:sp>
+    </p:spTree>
+    <p:extLst>
+      <p:ext uri="{BB962C8B-B14F-4D97-AF65-F5344CB8AC3E}">
+        <p14:creationId xmlns:p14="http://schemas.microsoft.com/office/powerpoint/2010/main" val="3994172782"/>
+      </p:ext>
+    </p:extLst>
+  </p:cSld>
+  <p:clrMapOvr>
+    <a:masterClrMapping/>
+  </p:clrMapOvr>
+</p:sld>
+</file>
+
+<file path=ppt/slides/slide16.xml><?xml version="1.0" encoding="utf-8"?>
+<p:sld xmlns:a="http://schemas.openxmlformats.org/drawingml/2006/main" xmlns:r="http://schemas.openxmlformats.org/officeDocument/2006/relationships" xmlns:p="http://schemas.openxmlformats.org/presentationml/2006/main">
+  <p:cSld>
+    <p:spTree>
+      <p:nvGrpSpPr>
+        <p:cNvPr id="1" name=""/>
+        <p:cNvGrpSpPr/>
+        <p:nvPr/>
+      </p:nvGrpSpPr>
+      <p:grpSpPr>
+        <a:xfrm>
+          <a:off x="0" y="0"/>
+          <a:ext cx="0" cy="0"/>
+          <a:chOff x="0" y="0"/>
+          <a:chExt cx="0" cy="0"/>
+        </a:xfrm>
+      </p:grpSpPr>
+      <p:sp>
+        <p:nvSpPr>
+          <p:cNvPr id="5" name="Title 4">
+            <a:extLst>
+              <a:ext uri="{FF2B5EF4-FFF2-40B4-BE49-F238E27FC236}">
+                <a16:creationId xmlns:a16="http://schemas.microsoft.com/office/drawing/2014/main" id="{424BE359-D8FA-C14D-BD59-8461CEAC087F}"/>
+              </a:ext>
+            </a:extLst>
+          </p:cNvPr>
+          <p:cNvSpPr>
+            <a:spLocks noGrp="1"/>
+          </p:cNvSpPr>
+          <p:nvPr>
+            <p:ph type="title"/>
+          </p:nvPr>
+        </p:nvSpPr>
+        <p:spPr/>
+        <p:txBody>
+          <a:bodyPr/>
+          <a:lstStyle/>
+          <a:p>
+            <a:pPr algn="ctr"/>
+            <a:r>
+              <a:rPr lang="en-US" dirty="0"/>
+              <a:t>Crime Rate vs. Median Home Values in Oak Park for 2014-2018</a:t>
+            </a:r>
+          </a:p>
+        </p:txBody>
+      </p:sp>
+      <p:pic>
+        <p:nvPicPr>
+          <p:cNvPr id="8" name="Content Placeholder 7" descr="Chart, scatter chart&#10;&#10;Description automatically generated">
+            <a:extLst>
+              <a:ext uri="{FF2B5EF4-FFF2-40B4-BE49-F238E27FC236}">
+                <a16:creationId xmlns:a16="http://schemas.microsoft.com/office/drawing/2014/main" id="{EA48A08C-41D2-2646-AA7D-4219B521BDAA}"/>
+              </a:ext>
+            </a:extLst>
+          </p:cNvPr>
+          <p:cNvPicPr>
+            <a:picLocks noGrp="1" noChangeAspect="1"/>
+          </p:cNvPicPr>
+          <p:nvPr>
+            <p:ph idx="1"/>
+          </p:nvPr>
+        </p:nvPicPr>
+        <p:blipFill>
+          <a:blip r:embed="rId2"/>
+          <a:stretch>
+            <a:fillRect/>
+          </a:stretch>
+        </p:blipFill>
+        <p:spPr>
+          <a:xfrm>
+            <a:off x="3352800" y="2172494"/>
+            <a:ext cx="5486400" cy="3657600"/>
+          </a:xfrm>
+        </p:spPr>
+      </p:pic>
+      <p:sp>
+        <p:nvSpPr>
           <p:cNvPr id="9" name="TextBox 8">
             <a:extLst>
               <a:ext uri="{FF2B5EF4-FFF2-40B4-BE49-F238E27FC236}">
@@ -4089,6 +4432,93 @@
     <p:extLst>
       <p:ext uri="{BB962C8B-B14F-4D97-AF65-F5344CB8AC3E}">
         <p14:creationId xmlns:p14="http://schemas.microsoft.com/office/powerpoint/2010/main" val="3698350479"/>
+      </p:ext>
+    </p:extLst>
+  </p:cSld>
+  <p:clrMapOvr>
+    <a:masterClrMapping/>
+  </p:clrMapOvr>
+</p:sld>
+</file>
+
+<file path=ppt/slides/slide17.xml><?xml version="1.0" encoding="utf-8"?>
+<p:sld xmlns:a="http://schemas.openxmlformats.org/drawingml/2006/main" xmlns:r="http://schemas.openxmlformats.org/officeDocument/2006/relationships" xmlns:p="http://schemas.openxmlformats.org/presentationml/2006/main">
+  <p:cSld>
+    <p:spTree>
+      <p:nvGrpSpPr>
+        <p:cNvPr id="1" name=""/>
+        <p:cNvGrpSpPr/>
+        <p:nvPr/>
+      </p:nvGrpSpPr>
+      <p:grpSpPr>
+        <a:xfrm>
+          <a:off x="0" y="0"/>
+          <a:ext cx="0" cy="0"/>
+          <a:chOff x="0" y="0"/>
+          <a:chExt cx="0" cy="0"/>
+        </a:xfrm>
+      </p:grpSpPr>
+      <p:sp>
+        <p:nvSpPr>
+          <p:cNvPr id="2" name="Title 1">
+            <a:extLst>
+              <a:ext uri="{FF2B5EF4-FFF2-40B4-BE49-F238E27FC236}">
+                <a16:creationId xmlns:a16="http://schemas.microsoft.com/office/drawing/2014/main" id="{7176A5A4-38EE-D340-912D-5E5B338887E7}"/>
+              </a:ext>
+            </a:extLst>
+          </p:cNvPr>
+          <p:cNvSpPr>
+            <a:spLocks noGrp="1"/>
+          </p:cNvSpPr>
+          <p:nvPr>
+            <p:ph type="title"/>
+          </p:nvPr>
+        </p:nvSpPr>
+        <p:spPr/>
+        <p:txBody>
+          <a:bodyPr/>
+          <a:lstStyle/>
+          <a:p>
+            <a:pPr algn="ctr"/>
+            <a:r>
+              <a:rPr lang="en-US" dirty="0"/>
+              <a:t>Overall Conclusions</a:t>
+            </a:r>
+          </a:p>
+        </p:txBody>
+      </p:sp>
+      <p:sp>
+        <p:nvSpPr>
+          <p:cNvPr id="3" name="Content Placeholder 2">
+            <a:extLst>
+              <a:ext uri="{FF2B5EF4-FFF2-40B4-BE49-F238E27FC236}">
+                <a16:creationId xmlns:a16="http://schemas.microsoft.com/office/drawing/2014/main" id="{EA8B7AEE-53CE-004B-ABF8-67CE77FE573C}"/>
+              </a:ext>
+            </a:extLst>
+          </p:cNvPr>
+          <p:cNvSpPr>
+            <a:spLocks noGrp="1"/>
+          </p:cNvSpPr>
+          <p:nvPr>
+            <p:ph idx="1"/>
+          </p:nvPr>
+        </p:nvSpPr>
+        <p:spPr/>
+        <p:txBody>
+          <a:bodyPr/>
+          <a:lstStyle/>
+          <a:p>
+            <a:pPr marL="0" indent="0">
+              <a:buNone/>
+            </a:pPr>
+            <a:endParaRPr lang="en-US" dirty="0"/>
+          </a:p>
+        </p:txBody>
+      </p:sp>
+    </p:spTree>
+    <p:extLst>
+      <p:ext uri="{BB962C8B-B14F-4D97-AF65-F5344CB8AC3E}">
+        <p14:creationId xmlns:p14="http://schemas.microsoft.com/office/powerpoint/2010/main" val="1350475094"/>
       </p:ext>
     </p:extLst>
   </p:cSld>
@@ -4120,7 +4550,7 @@
           <p:cNvPr id="2" name="Title 1">
             <a:extLst>
               <a:ext uri="{FF2B5EF4-FFF2-40B4-BE49-F238E27FC236}">
-                <a16:creationId xmlns:a16="http://schemas.microsoft.com/office/drawing/2014/main" id="{70DDC109-01B6-0842-B9D6-37514348FD88}"/>
+                <a16:creationId xmlns:a16="http://schemas.microsoft.com/office/drawing/2014/main" id="{EFB12233-A6ED-6B42-A050-CBA705B65BA3}"/>
               </a:ext>
             </a:extLst>
           </p:cNvPr>
@@ -4136,9 +4566,10 @@
           <a:bodyPr/>
           <a:lstStyle/>
           <a:p>
+            <a:pPr algn="ctr"/>
             <a:r>
               <a:rPr lang="en-US" dirty="0"/>
-              <a:t>Null Hypothesis</a:t>
+              <a:t>Data Sources</a:t>
             </a:r>
           </a:p>
         </p:txBody>
@@ -4148,7 +4579,7 @@
           <p:cNvPr id="3" name="Content Placeholder 2">
             <a:extLst>
               <a:ext uri="{FF2B5EF4-FFF2-40B4-BE49-F238E27FC236}">
-                <a16:creationId xmlns:a16="http://schemas.microsoft.com/office/drawing/2014/main" id="{CA631518-B36F-AB4A-90D4-6762FE2E5C57}"/>
+                <a16:creationId xmlns:a16="http://schemas.microsoft.com/office/drawing/2014/main" id="{FCB744C6-7571-E74E-A95E-B33FC0DDE21C}"/>
               </a:ext>
             </a:extLst>
           </p:cNvPr>
@@ -4161,17 +4592,70 @@
         </p:nvSpPr>
         <p:spPr/>
         <p:txBody>
-          <a:bodyPr>
-            <a:normAutofit fontScale="92500" lnSpcReduction="10000"/>
-          </a:bodyPr>
-          <a:lstStyle/>
-          <a:p>
-            <a:pPr marL="0" indent="0">
-              <a:buNone/>
-            </a:pPr>
+          <a:bodyPr/>
+          <a:lstStyle/>
+          <a:p>
             <a:r>
               <a:rPr lang="en-US" dirty="0"/>
-              <a:t>Our null hypothesis is the following: a decrease in the violent crime rate results in reductions in the poverty rate and a simultaneous increase in median income and median home prices. Our confidence level is 95% or a p-value of 0.05. We hypothesize that the p-value of these statistics in Oak Park, zip codes 95817 and 95820, is statistically different from Sacramento County. Our observed variables are the crime rate, poverty rate, income rate, and median home prices of Oak Park and Sacramento County. Our expected values are the crime rate, poverty rate, income rate, and median home prices for all of Sacramento County. Based on the observed versus the expected values, we can calculate the p-value. If the p-value is less than 0.05, we will accept the hypothesis. This analysis matters as police departments could use it to understand better where to allocate resources.</a:t>
+              <a:t>Sacramento County Datasets: </a:t>
+            </a:r>
+            <a:r>
+              <a:rPr lang="en-US" u="sng" dirty="0">
+                <a:hlinkClick r:id="rId2"/>
+              </a:rPr>
+              <a:t>https://data.saccounty.net/datasets/9a7f2df25a584ff9b55db274704ad7c9_0/geoservice</a:t>
+            </a:r>
+            <a:r>
+              <a:rPr lang="en-US" dirty="0"/>
+              <a:t>. </a:t>
+            </a:r>
+          </a:p>
+          <a:p>
+            <a:r>
+              <a:rPr lang="en-US" dirty="0"/>
+              <a:t>Capitol Impact list of Sacramento County Zip Codes: </a:t>
+            </a:r>
+            <a:r>
+              <a:rPr lang="en-US" u="sng" dirty="0">
+                <a:hlinkClick r:id="rId3"/>
+              </a:rPr>
+              <a:t>http://www.ciclt.net/sn/clt/capitolimpact/gw_ziplist.aspx?FIPS=06067</a:t>
+            </a:r>
+            <a:r>
+              <a:rPr lang="en-US" dirty="0"/>
+              <a:t> </a:t>
+            </a:r>
+          </a:p>
+          <a:p>
+            <a:r>
+              <a:rPr lang="en-US" dirty="0"/>
+              <a:t>Census API: </a:t>
+            </a:r>
+            <a:r>
+              <a:rPr lang="en-US" dirty="0">
+                <a:hlinkClick r:id="rId4"/>
+              </a:rPr>
+              <a:t>https://api.census.gov/data.html</a:t>
+            </a:r>
+            <a:r>
+              <a:rPr lang="en-US" dirty="0"/>
+              <a:t> </a:t>
+            </a:r>
+          </a:p>
+          <a:p>
+            <a:r>
+              <a:rPr lang="en-US" dirty="0"/>
+              <a:t>Google Maps API: </a:t>
+            </a:r>
+            <a:r>
+              <a:rPr lang="en-US" dirty="0">
+                <a:hlinkClick r:id="rId5"/>
+              </a:rPr>
+              <a:t>https://cloud.google.com/maps-platform</a:t>
+            </a:r>
+            <a:r>
+              <a:rPr lang="en-US" dirty="0"/>
+              <a:t> </a:t>
             </a:r>
           </a:p>
         </p:txBody>
@@ -4179,7 +4663,7 @@
     </p:spTree>
     <p:extLst>
       <p:ext uri="{BB962C8B-B14F-4D97-AF65-F5344CB8AC3E}">
-        <p14:creationId xmlns:p14="http://schemas.microsoft.com/office/powerpoint/2010/main" val="4097152298"/>
+        <p14:creationId xmlns:p14="http://schemas.microsoft.com/office/powerpoint/2010/main" val="2208772676"/>
       </p:ext>
     </p:extLst>
   </p:cSld>
@@ -4211,7 +4695,7 @@
           <p:cNvPr id="2" name="Title 1">
             <a:extLst>
               <a:ext uri="{FF2B5EF4-FFF2-40B4-BE49-F238E27FC236}">
-                <a16:creationId xmlns:a16="http://schemas.microsoft.com/office/drawing/2014/main" id="{7A2CF5BA-5CD8-EA4E-AE25-F48196B39B37}"/>
+                <a16:creationId xmlns:a16="http://schemas.microsoft.com/office/drawing/2014/main" id="{3E5534ED-35EA-A149-BEC2-E0076B965B2C}"/>
               </a:ext>
             </a:extLst>
           </p:cNvPr>
@@ -4227,9 +4711,10 @@
           <a:bodyPr/>
           <a:lstStyle/>
           <a:p>
+            <a:pPr algn="ctr"/>
             <a:r>
               <a:rPr lang="en-US" dirty="0"/>
-              <a:t>Definitions of Terms Used</a:t>
+              <a:t>Data Cleaning</a:t>
             </a:r>
           </a:p>
         </p:txBody>
@@ -4239,7 +4724,7 @@
           <p:cNvPr id="3" name="Content Placeholder 2">
             <a:extLst>
               <a:ext uri="{FF2B5EF4-FFF2-40B4-BE49-F238E27FC236}">
-                <a16:creationId xmlns:a16="http://schemas.microsoft.com/office/drawing/2014/main" id="{15AEA719-D28A-A44E-B99F-4528774D6D11}"/>
+                <a16:creationId xmlns:a16="http://schemas.microsoft.com/office/drawing/2014/main" id="{9C6CB3F0-ED25-D842-9052-96A683255F78}"/>
               </a:ext>
             </a:extLst>
           </p:cNvPr>
@@ -4252,42 +4737,59 @@
         </p:nvSpPr>
         <p:spPr/>
         <p:txBody>
-          <a:bodyPr>
-            <a:normAutofit/>
-          </a:bodyPr>
+          <a:bodyPr/>
           <a:lstStyle/>
           <a:p>
             <a:r>
               <a:rPr lang="en-US" dirty="0"/>
-              <a:t>“PC Personal”: refers to California Penal Code Crimes Against the Person which include Homicide, Mayhem, Kidnapping, Hostages, Robbery, Attempts to Kill, Assaults, False Imprisonment and Human Trafficking, and Assault and Battery.</a:t>
-            </a:r>
-          </a:p>
-          <a:p>
+              <a:t>Cleaned the data obtained from Census, Sacramento County and Google Maps using the following methodology:</a:t>
+            </a:r>
+          </a:p>
+          <a:p>
+            <a:pPr lvl="2"/>
             <a:r>
               <a:rPr lang="en-US" dirty="0"/>
-              <a:t>“PC All”: refers to California Penal Code of all other types of crime including crimes against property, crimes against public justice, crimes against the person involving sexual assault, criminal threats, and miscellaneous crimes. </a:t>
-            </a:r>
-          </a:p>
-          <a:p>
+              <a:t>Rename columns</a:t>
+            </a:r>
+          </a:p>
+          <a:p>
+            <a:pPr lvl="2"/>
             <a:r>
               <a:rPr lang="en-US" dirty="0"/>
-              <a:t>Additional information can be found here: </a:t>
-            </a:r>
-            <a:r>
-              <a:rPr lang="en-US" dirty="0">
-                <a:hlinkClick r:id="rId2"/>
-              </a:rPr>
-              <a:t>https://leginfo.legislature.ca.gov/</a:t>
-            </a:r>
+              <a:t>Add columns</a:t>
+            </a:r>
+          </a:p>
+          <a:p>
+            <a:pPr lvl="2"/>
             <a:r>
               <a:rPr lang="en-US" dirty="0"/>
-              <a:t> </a:t>
-            </a:r>
-          </a:p>
-          <a:p>
-            <a:endParaRPr lang="en-US" dirty="0"/>
-          </a:p>
-          <a:p>
+              <a:t>Drop null rows</a:t>
+            </a:r>
+          </a:p>
+          <a:p>
+            <a:pPr lvl="2"/>
+            <a:r>
+              <a:rPr lang="en-US" dirty="0"/>
+              <a:t>Drop incomplete data</a:t>
+            </a:r>
+          </a:p>
+          <a:p>
+            <a:pPr lvl="2"/>
+            <a:r>
+              <a:rPr lang="en-US" dirty="0"/>
+              <a:t>Filter out years to only include 2014-2018</a:t>
+            </a:r>
+          </a:p>
+          <a:p>
+            <a:pPr lvl="2"/>
+            <a:r>
+              <a:rPr lang="en-US" dirty="0"/>
+              <a:t>Try/</a:t>
+            </a:r>
+            <a:r>
+              <a:rPr lang="en-US"/>
+              <a:t>Except blocks</a:t>
+            </a:r>
             <a:endParaRPr lang="en-US" dirty="0"/>
           </a:p>
         </p:txBody>
@@ -4295,7 +4797,7 @@
     </p:spTree>
     <p:extLst>
       <p:ext uri="{BB962C8B-B14F-4D97-AF65-F5344CB8AC3E}">
-        <p14:creationId xmlns:p14="http://schemas.microsoft.com/office/powerpoint/2010/main" val="1897650247"/>
+        <p14:creationId xmlns:p14="http://schemas.microsoft.com/office/powerpoint/2010/main" val="2946427430"/>
       </p:ext>
     </p:extLst>
   </p:cSld>
@@ -4327,7 +4829,7 @@
           <p:cNvPr id="2" name="Title 1">
             <a:extLst>
               <a:ext uri="{FF2B5EF4-FFF2-40B4-BE49-F238E27FC236}">
-                <a16:creationId xmlns:a16="http://schemas.microsoft.com/office/drawing/2014/main" id="{965BE19F-7A99-ED47-AE18-076D3DB49216}"/>
+                <a16:creationId xmlns:a16="http://schemas.microsoft.com/office/drawing/2014/main" id="{70DDC109-01B6-0842-B9D6-37514348FD88}"/>
               </a:ext>
             </a:extLst>
           </p:cNvPr>
@@ -4343,55 +4845,83 @@
           <a:bodyPr/>
           <a:lstStyle/>
           <a:p>
-            <a:pPr algn="ctr"/>
             <a:r>
               <a:rPr lang="en-US" dirty="0"/>
-              <a:t>Sacramento County with Postal Zip Codes</a:t>
-            </a:r>
-          </a:p>
-        </p:txBody>
-      </p:sp>
-      <p:pic>
-        <p:nvPicPr>
-          <p:cNvPr id="5" name="Content Placeholder 4">
-            <a:extLst>
-              <a:ext uri="{FF2B5EF4-FFF2-40B4-BE49-F238E27FC236}">
-                <a16:creationId xmlns:a16="http://schemas.microsoft.com/office/drawing/2014/main" id="{8F47734C-90E9-2449-A9DC-60D9D3541E63}"/>
-              </a:ext>
-              <a:ext uri="{C183D7F6-B498-43B3-948B-1728B52AA6E4}">
-                <adec:decorative xmlns:adec="http://schemas.microsoft.com/office/drawing/2017/decorative" val="1"/>
-              </a:ext>
-            </a:extLst>
-          </p:cNvPr>
-          <p:cNvPicPr>
-            <a:picLocks noGrp="1" noChangeAspect="1"/>
-          </p:cNvPicPr>
+              <a:t>Null Hypothesis</a:t>
+            </a:r>
+          </a:p>
+        </p:txBody>
+      </p:sp>
+      <p:sp>
+        <p:nvSpPr>
+          <p:cNvPr id="3" name="Content Placeholder 2">
+            <a:extLst>
+              <a:ext uri="{FF2B5EF4-FFF2-40B4-BE49-F238E27FC236}">
+                <a16:creationId xmlns:a16="http://schemas.microsoft.com/office/drawing/2014/main" id="{CA631518-B36F-AB4A-90D4-6762FE2E5C57}"/>
+              </a:ext>
+            </a:extLst>
+          </p:cNvPr>
+          <p:cNvSpPr>
+            <a:spLocks noGrp="1"/>
+          </p:cNvSpPr>
           <p:nvPr>
             <p:ph idx="1"/>
           </p:nvPr>
-        </p:nvPicPr>
-        <p:blipFill>
-          <a:blip r:embed="rId2"/>
-          <a:stretch>
-            <a:fillRect/>
-          </a:stretch>
-        </p:blipFill>
-        <p:spPr>
-          <a:xfrm>
-            <a:off x="3489434" y="1690688"/>
-            <a:ext cx="5213131" cy="4236967"/>
-          </a:xfrm>
-          <a:ln w="3175">
-            <a:solidFill>
-              <a:schemeClr val="tx1"/>
-            </a:solidFill>
-          </a:ln>
-        </p:spPr>
-      </p:pic>
+        </p:nvSpPr>
+        <p:spPr/>
+        <p:txBody>
+          <a:bodyPr>
+            <a:normAutofit fontScale="92500"/>
+          </a:bodyPr>
+          <a:lstStyle/>
+          <a:p>
+            <a:pPr lvl="0"/>
+            <a:r>
+              <a:rPr lang="en-US" dirty="0"/>
+              <a:t>A decrease in the poverty rate is correlated with a decrease in the crime rate.</a:t>
+            </a:r>
+          </a:p>
+          <a:p>
+            <a:pPr lvl="0"/>
+            <a:r>
+              <a:rPr lang="en-US" dirty="0"/>
+              <a:t>An increase in the median home price leads to a decrease in crime.</a:t>
+            </a:r>
+          </a:p>
+          <a:p>
+            <a:pPr lvl="0"/>
+            <a:r>
+              <a:rPr lang="en-US" dirty="0"/>
+              <a:t>Sacramento County and Oak Park both follow the same trends with respect to the relationships between poverty, crime, and median home values</a:t>
+            </a:r>
+          </a:p>
+          <a:p>
+            <a:pPr lvl="0"/>
+            <a:r>
+              <a:rPr lang="en-US" dirty="0"/>
+              <a:t>Confidence level of 95%</a:t>
+            </a:r>
+          </a:p>
+          <a:p>
+            <a:pPr lvl="0"/>
+            <a:r>
+              <a:rPr lang="en-US" dirty="0"/>
+              <a:t>Observed values are the crime rate, poverty rate, and median home prices for Oak Park. </a:t>
+            </a:r>
+          </a:p>
+          <a:p>
+            <a:pPr lvl="0"/>
+            <a:r>
+              <a:rPr lang="en-US" dirty="0"/>
+              <a:t>Expected values are the crime rate, poverty rate, and median home prices for Sacramento County.</a:t>
+            </a:r>
+          </a:p>
+        </p:txBody>
+      </p:sp>
     </p:spTree>
     <p:extLst>
       <p:ext uri="{BB962C8B-B14F-4D97-AF65-F5344CB8AC3E}">
-        <p14:creationId xmlns:p14="http://schemas.microsoft.com/office/powerpoint/2010/main" val="3361318091"/>
+        <p14:creationId xmlns:p14="http://schemas.microsoft.com/office/powerpoint/2010/main" val="4097152298"/>
       </p:ext>
     </p:extLst>
   </p:cSld>
@@ -4423,7 +4953,7 @@
           <p:cNvPr id="2" name="Title 1">
             <a:extLst>
               <a:ext uri="{FF2B5EF4-FFF2-40B4-BE49-F238E27FC236}">
-                <a16:creationId xmlns:a16="http://schemas.microsoft.com/office/drawing/2014/main" id="{E4B28D0C-81B2-C14D-B68B-B2195C4C0AFE}"/>
+                <a16:creationId xmlns:a16="http://schemas.microsoft.com/office/drawing/2014/main" id="{7A2CF5BA-5CD8-EA4E-AE25-F48196B39B37}"/>
               </a:ext>
             </a:extLst>
           </p:cNvPr>
@@ -4441,7 +4971,7 @@
           <a:p>
             <a:r>
               <a:rPr lang="en-US" dirty="0"/>
-              <a:t>Questions</a:t>
+              <a:t>Definitions of Terms Used</a:t>
             </a:r>
           </a:p>
         </p:txBody>
@@ -4451,7 +4981,7 @@
           <p:cNvPr id="3" name="Content Placeholder 2">
             <a:extLst>
               <a:ext uri="{FF2B5EF4-FFF2-40B4-BE49-F238E27FC236}">
-                <a16:creationId xmlns:a16="http://schemas.microsoft.com/office/drawing/2014/main" id="{20915F77-71B6-6049-826B-9DE3D942E07F}"/>
+                <a16:creationId xmlns:a16="http://schemas.microsoft.com/office/drawing/2014/main" id="{15AEA719-D28A-A44E-B99F-4528774D6D11}"/>
               </a:ext>
             </a:extLst>
           </p:cNvPr>
@@ -4465,57 +4995,49 @@
         <p:spPr/>
         <p:txBody>
           <a:bodyPr>
-            <a:normAutofit fontScale="92500" lnSpcReduction="10000"/>
+            <a:normAutofit/>
           </a:bodyPr>
           <a:lstStyle/>
           <a:p>
             <a:r>
               <a:rPr lang="en-US" dirty="0"/>
-              <a:t>What are the overall crime rate trends in Sacramento County and Oak Park in particular?</a:t>
+              <a:t>“PC Personal”: refers to California Penal Code Crimes Against the Person which include Homicide, Mayhem, Kidnapping, Hostages, Robbery, Attempts to Kill, Assaults, False Imprisonment and Human Trafficking, and Assault and Battery.</a:t>
             </a:r>
           </a:p>
           <a:p>
             <a:r>
               <a:rPr lang="en-US" dirty="0"/>
-              <a:t>What are the crime rates for Oak Park for 2014-2018?</a:t>
+              <a:t>“PC All”: refers to California Penal Code of all other types of crime including crimes against property, crimes against public justice, crimes against the person involving sexual assault, criminal threats, and miscellaneous crimes. </a:t>
             </a:r>
           </a:p>
           <a:p>
             <a:r>
               <a:rPr lang="en-US" dirty="0"/>
-              <a:t>How would a heat map of the crime rate for each zip code in Sacramento County appear?</a:t>
-            </a:r>
-          </a:p>
-          <a:p>
+              <a:t>Additional information can be found here: </a:t>
+            </a:r>
+            <a:r>
+              <a:rPr lang="en-US" dirty="0">
+                <a:hlinkClick r:id="rId2"/>
+              </a:rPr>
+              <a:t>https://leginfo.legislature.ca.gov/</a:t>
+            </a:r>
             <a:r>
               <a:rPr lang="en-US" dirty="0"/>
-              <a:t>How would a heat map of the poverty rate for each zip code in Sacramento County appear?</a:t>
-            </a:r>
-          </a:p>
-          <a:p>
-            <a:r>
-              <a:rPr lang="en-US" dirty="0"/>
-              <a:t>What is  the crime rate versus the poverty rate for Sacramento County for 2014-2018?</a:t>
-            </a:r>
-          </a:p>
-          <a:p>
-            <a:r>
-              <a:rPr lang="en-US" dirty="0"/>
-              <a:t>Is there a correlation between the poverty rate and the crime rate?</a:t>
-            </a:r>
-          </a:p>
-          <a:p>
-            <a:r>
-              <a:rPr lang="en-US" dirty="0"/>
-              <a:t>Is there a correlation between home prices and the crime rate?</a:t>
-            </a:r>
+              <a:t> </a:t>
+            </a:r>
+          </a:p>
+          <a:p>
+            <a:endParaRPr lang="en-US" dirty="0"/>
+          </a:p>
+          <a:p>
+            <a:endParaRPr lang="en-US" dirty="0"/>
           </a:p>
         </p:txBody>
       </p:sp>
     </p:spTree>
     <p:extLst>
       <p:ext uri="{BB962C8B-B14F-4D97-AF65-F5344CB8AC3E}">
-        <p14:creationId xmlns:p14="http://schemas.microsoft.com/office/powerpoint/2010/main" val="342459698"/>
+        <p14:creationId xmlns:p14="http://schemas.microsoft.com/office/powerpoint/2010/main" val="1897650247"/>
       </p:ext>
     </p:extLst>
   </p:cSld>
@@ -4528,6 +5050,14 @@
 <file path=ppt/slides/slide6.xml><?xml version="1.0" encoding="utf-8"?>
 <p:sld xmlns:a="http://schemas.openxmlformats.org/drawingml/2006/main" xmlns:r="http://schemas.openxmlformats.org/officeDocument/2006/relationships" xmlns:p="http://schemas.openxmlformats.org/presentationml/2006/main">
   <p:cSld>
+    <p:bg>
+      <p:bgPr>
+        <a:solidFill>
+          <a:schemeClr val="bg1"/>
+        </a:solidFill>
+        <a:effectLst/>
+      </p:bgPr>
+    </p:bg>
     <p:spTree>
       <p:nvGrpSpPr>
         <p:cNvPr id="1" name=""/>
@@ -4542,12 +5072,154 @@
           <a:chExt cx="0" cy="0"/>
         </a:xfrm>
       </p:grpSpPr>
+      <p:sp useBgFill="1">
+        <p:nvSpPr>
+          <p:cNvPr id="20" name="Rectangle 11">
+            <a:extLst>
+              <a:ext uri="{FF2B5EF4-FFF2-40B4-BE49-F238E27FC236}">
+                <a16:creationId xmlns:a16="http://schemas.microsoft.com/office/drawing/2014/main" id="{6E47FE40-F70B-4BF4-9CEA-F14800A6A3CC}"/>
+              </a:ext>
+              <a:ext uri="{C183D7F6-B498-43B3-948B-1728B52AA6E4}">
+                <adec:decorative xmlns:adec="http://schemas.microsoft.com/office/drawing/2017/decorative" val="1"/>
+              </a:ext>
+            </a:extLst>
+          </p:cNvPr>
+          <p:cNvSpPr>
+            <a:spLocks noGrp="1" noRot="1" noChangeAspect="1" noMove="1" noResize="1" noEditPoints="1" noAdjustHandles="1" noChangeArrowheads="1" noChangeShapeType="1" noTextEdit="1"/>
+          </p:cNvSpPr>
+          <p:nvPr>
+            <p:extLst>
+              <p:ext uri="{386F3935-93C4-4BCD-93E2-E3B085C9AB24}">
+                <p16:designElem xmlns:p16="http://schemas.microsoft.com/office/powerpoint/2015/main" val="1"/>
+              </p:ext>
+            </p:extLst>
+          </p:nvPr>
+        </p:nvSpPr>
+        <p:spPr>
+          <a:xfrm>
+            <a:off x="0" y="0"/>
+            <a:ext cx="12192000" cy="6858000"/>
+          </a:xfrm>
+          <a:prstGeom prst="rect">
+            <a:avLst/>
+          </a:prstGeom>
+          <a:ln w="12700" cap="flat" cmpd="sng" algn="ctr">
+            <a:noFill/>
+            <a:prstDash val="solid"/>
+            <a:miter lim="800000"/>
+          </a:ln>
+          <a:effectLst/>
+          <a:extLst>
+            <a:ext uri="{91240B29-F687-4F45-9708-019B960494DF}">
+              <a14:hiddenLine xmlns:a14="http://schemas.microsoft.com/office/drawing/2010/main" w="12700" cap="flat" cmpd="sng" algn="ctr">
+                <a:solidFill>
+                  <a:schemeClr val="accent1">
+                    <a:shade val="50000"/>
+                  </a:schemeClr>
+                </a:solidFill>
+                <a:prstDash val="solid"/>
+                <a:miter lim="800000"/>
+              </a14:hiddenLine>
+            </a:ext>
+          </a:extLst>
+        </p:spPr>
+        <p:style>
+          <a:lnRef idx="2">
+            <a:schemeClr val="accent1">
+              <a:shade val="50000"/>
+            </a:schemeClr>
+          </a:lnRef>
+          <a:fillRef idx="1">
+            <a:schemeClr val="accent1"/>
+          </a:fillRef>
+          <a:effectRef idx="0">
+            <a:schemeClr val="accent1"/>
+          </a:effectRef>
+          <a:fontRef idx="minor">
+            <a:schemeClr val="lt1"/>
+          </a:fontRef>
+        </p:style>
+        <p:txBody>
+          <a:bodyPr rtlCol="0" anchor="ctr"/>
+          <a:lstStyle/>
+          <a:p>
+            <a:pPr algn="ctr"/>
+            <a:endParaRPr lang="en-US"/>
+          </a:p>
+        </p:txBody>
+      </p:sp>
+      <p:sp>
+        <p:nvSpPr>
+          <p:cNvPr id="21" name="Rectangle 13">
+            <a:extLst>
+              <a:ext uri="{FF2B5EF4-FFF2-40B4-BE49-F238E27FC236}">
+                <a16:creationId xmlns:a16="http://schemas.microsoft.com/office/drawing/2014/main" id="{78826778-2F54-4F8E-BA27-C95E488D3305}"/>
+              </a:ext>
+              <a:ext uri="{C183D7F6-B498-43B3-948B-1728B52AA6E4}">
+                <adec:decorative xmlns:adec="http://schemas.microsoft.com/office/drawing/2017/decorative" val="1"/>
+              </a:ext>
+            </a:extLst>
+          </p:cNvPr>
+          <p:cNvSpPr>
+            <a:spLocks noGrp="1" noRot="1" noChangeAspect="1" noMove="1" noResize="1" noEditPoints="1" noAdjustHandles="1" noChangeArrowheads="1" noChangeShapeType="1" noTextEdit="1"/>
+          </p:cNvSpPr>
+          <p:nvPr>
+            <p:extLst>
+              <p:ext uri="{386F3935-93C4-4BCD-93E2-E3B085C9AB24}">
+                <p16:designElem xmlns:p16="http://schemas.microsoft.com/office/powerpoint/2015/main" val="1"/>
+              </p:ext>
+            </p:extLst>
+          </p:nvPr>
+        </p:nvSpPr>
+        <p:spPr>
+          <a:xfrm>
+            <a:off x="0" y="0"/>
+            <a:ext cx="5448300" cy="6858000"/>
+          </a:xfrm>
+          <a:prstGeom prst="rect">
+            <a:avLst/>
+          </a:prstGeom>
+          <a:solidFill>
+            <a:schemeClr val="accent2">
+              <a:lumMod val="20000"/>
+              <a:lumOff val="80000"/>
+            </a:schemeClr>
+          </a:solidFill>
+          <a:ln>
+            <a:noFill/>
+          </a:ln>
+        </p:spPr>
+        <p:style>
+          <a:lnRef idx="2">
+            <a:schemeClr val="accent1">
+              <a:shade val="50000"/>
+            </a:schemeClr>
+          </a:lnRef>
+          <a:fillRef idx="1">
+            <a:schemeClr val="accent1"/>
+          </a:fillRef>
+          <a:effectRef idx="0">
+            <a:schemeClr val="accent1"/>
+          </a:effectRef>
+          <a:fontRef idx="minor">
+            <a:schemeClr val="lt1"/>
+          </a:fontRef>
+        </p:style>
+        <p:txBody>
+          <a:bodyPr rtlCol="0" anchor="ctr"/>
+          <a:lstStyle/>
+          <a:p>
+            <a:pPr algn="ctr"/>
+            <a:endParaRPr lang="en-US"/>
+          </a:p>
+        </p:txBody>
+      </p:sp>
       <p:sp>
         <p:nvSpPr>
           <p:cNvPr id="2" name="Title 1">
             <a:extLst>
               <a:ext uri="{FF2B5EF4-FFF2-40B4-BE49-F238E27FC236}">
-                <a16:creationId xmlns:a16="http://schemas.microsoft.com/office/drawing/2014/main" id="{6434A0BD-B447-874F-840E-9393F0A760BA}"/>
+                <a16:creationId xmlns:a16="http://schemas.microsoft.com/office/drawing/2014/main" id="{965BE19F-7A99-ED47-AE18-076D3DB49216}"/>
               </a:ext>
             </a:extLst>
           </p:cNvPr>
@@ -4558,25 +5230,39 @@
             <p:ph type="title"/>
           </p:nvPr>
         </p:nvSpPr>
-        <p:spPr/>
-        <p:txBody>
-          <a:bodyPr/>
+        <p:spPr>
+          <a:xfrm>
+            <a:off x="1001676" y="1259958"/>
+            <a:ext cx="3444948" cy="2481729"/>
+          </a:xfrm>
+        </p:spPr>
+        <p:txBody>
+          <a:bodyPr vert="horz" lIns="91440" tIns="45720" rIns="91440" bIns="45720" rtlCol="0" anchor="b">
+            <a:normAutofit/>
+          </a:bodyPr>
           <a:lstStyle/>
           <a:p>
             <a:pPr algn="ctr"/>
             <a:r>
-              <a:rPr lang="en-US" dirty="0"/>
-              <a:t>Overall Poverty Rate was flat</a:t>
+              <a:rPr lang="en-US" sz="3200" kern="1200" dirty="0">
+                <a:solidFill>
+                  <a:srgbClr val="595959"/>
+                </a:solidFill>
+                <a:latin typeface="+mj-lt"/>
+                <a:ea typeface="+mj-ea"/>
+                <a:cs typeface="+mj-cs"/>
+              </a:rPr>
+              <a:t>Sacramento County with Postal Zip Codes</a:t>
             </a:r>
           </a:p>
         </p:txBody>
       </p:sp>
       <p:pic>
         <p:nvPicPr>
-          <p:cNvPr id="6" name="Content Placeholder 5" descr="Map&#10;&#10;Description automatically generated">
-            <a:extLst>
-              <a:ext uri="{FF2B5EF4-FFF2-40B4-BE49-F238E27FC236}">
-                <a16:creationId xmlns:a16="http://schemas.microsoft.com/office/drawing/2014/main" id="{489F57F8-106E-9B4F-8875-1070890E444C}"/>
+          <p:cNvPr id="7" name="Content Placeholder 6">
+            <a:extLst>
+              <a:ext uri="{FF2B5EF4-FFF2-40B4-BE49-F238E27FC236}">
+                <a16:creationId xmlns:a16="http://schemas.microsoft.com/office/drawing/2014/main" id="{33C7DE33-1307-9B4E-916B-60E04DA4506B}"/>
               </a:ext>
             </a:extLst>
           </p:cNvPr>
@@ -4584,7 +5270,7 @@
             <a:picLocks noGrp="1" noChangeAspect="1"/>
           </p:cNvPicPr>
           <p:nvPr>
-            <p:ph sz="half" idx="1"/>
+            <p:ph idx="1"/>
           </p:nvPr>
         </p:nvPicPr>
         <p:blipFill>
@@ -4595,115 +5281,18 @@
         </p:blipFill>
         <p:spPr>
           <a:xfrm>
-            <a:off x="1714500" y="2534444"/>
-            <a:ext cx="3429000" cy="2933700"/>
-          </a:xfrm>
-        </p:spPr>
-      </p:pic>
-      <p:pic>
-        <p:nvPicPr>
-          <p:cNvPr id="8" name="Content Placeholder 7">
-            <a:extLst>
-              <a:ext uri="{FF2B5EF4-FFF2-40B4-BE49-F238E27FC236}">
-                <a16:creationId xmlns:a16="http://schemas.microsoft.com/office/drawing/2014/main" id="{3E56AA57-BE20-3E43-B914-E664F90F28B3}"/>
-              </a:ext>
-            </a:extLst>
-          </p:cNvPr>
-          <p:cNvPicPr>
-            <a:picLocks noGrp="1" noChangeAspect="1"/>
-          </p:cNvPicPr>
-          <p:nvPr>
-            <p:ph sz="half" idx="2"/>
-          </p:nvPr>
-        </p:nvPicPr>
-        <p:blipFill>
-          <a:blip r:embed="rId3"/>
-          <a:stretch>
-            <a:fillRect/>
-          </a:stretch>
-        </p:blipFill>
-        <p:spPr>
-          <a:xfrm>
-            <a:off x="6915150" y="2528094"/>
-            <a:ext cx="3695700" cy="2946400"/>
-          </a:xfrm>
-        </p:spPr>
-      </p:pic>
-      <p:sp>
-        <p:nvSpPr>
-          <p:cNvPr id="10" name="TextBox 9">
-            <a:extLst>
-              <a:ext uri="{FF2B5EF4-FFF2-40B4-BE49-F238E27FC236}">
-                <a16:creationId xmlns:a16="http://schemas.microsoft.com/office/drawing/2014/main" id="{B8C2ABB4-1808-2348-9921-AD5EA0519776}"/>
-              </a:ext>
-            </a:extLst>
-          </p:cNvPr>
-          <p:cNvSpPr txBox="1"/>
-          <p:nvPr/>
-        </p:nvSpPr>
-        <p:spPr>
-          <a:xfrm>
-            <a:off x="2958262" y="2019318"/>
-            <a:ext cx="751890" cy="369332"/>
+            <a:off x="7237268" y="1380565"/>
+            <a:ext cx="3165763" cy="4096870"/>
           </a:xfrm>
           <a:prstGeom prst="rect">
             <a:avLst/>
           </a:prstGeom>
-          <a:noFill/>
         </p:spPr>
-        <p:txBody>
-          <a:bodyPr wrap="square" rtlCol="0">
-            <a:spAutoFit/>
-          </a:bodyPr>
-          <a:lstStyle/>
-          <a:p>
-            <a:pPr algn="ctr"/>
-            <a:r>
-              <a:rPr lang="en-US" dirty="0"/>
-              <a:t>2014</a:t>
-            </a:r>
-          </a:p>
-        </p:txBody>
-      </p:sp>
-      <p:sp>
-        <p:nvSpPr>
-          <p:cNvPr id="11" name="TextBox 10">
-            <a:extLst>
-              <a:ext uri="{FF2B5EF4-FFF2-40B4-BE49-F238E27FC236}">
-                <a16:creationId xmlns:a16="http://schemas.microsoft.com/office/drawing/2014/main" id="{D781E60D-F8CC-124D-BB96-A872F867B5D5}"/>
-              </a:ext>
-            </a:extLst>
-          </p:cNvPr>
-          <p:cNvSpPr txBox="1"/>
-          <p:nvPr/>
-        </p:nvSpPr>
-        <p:spPr>
-          <a:xfrm>
-            <a:off x="8389483" y="2019318"/>
-            <a:ext cx="751889" cy="369332"/>
-          </a:xfrm>
-          <a:prstGeom prst="rect">
-            <a:avLst/>
-          </a:prstGeom>
-          <a:noFill/>
-        </p:spPr>
-        <p:txBody>
-          <a:bodyPr wrap="square" rtlCol="0">
-            <a:spAutoFit/>
-          </a:bodyPr>
-          <a:lstStyle/>
-          <a:p>
-            <a:r>
-              <a:rPr lang="en-US" dirty="0"/>
-              <a:t>2018</a:t>
-            </a:r>
-          </a:p>
-        </p:txBody>
-      </p:sp>
+      </p:pic>
     </p:spTree>
     <p:extLst>
       <p:ext uri="{BB962C8B-B14F-4D97-AF65-F5344CB8AC3E}">
-        <p14:creationId xmlns:p14="http://schemas.microsoft.com/office/powerpoint/2010/main" val="3157523059"/>
+        <p14:creationId xmlns:p14="http://schemas.microsoft.com/office/powerpoint/2010/main" val="3361318091"/>
       </p:ext>
     </p:extLst>
   </p:cSld>
@@ -4735,7 +5324,7 @@
           <p:cNvPr id="2" name="Title 1">
             <a:extLst>
               <a:ext uri="{FF2B5EF4-FFF2-40B4-BE49-F238E27FC236}">
-                <a16:creationId xmlns:a16="http://schemas.microsoft.com/office/drawing/2014/main" id="{8E9CDD85-B6A4-624A-B06F-2F4A29CAE38B}"/>
+                <a16:creationId xmlns:a16="http://schemas.microsoft.com/office/drawing/2014/main" id="{E4B28D0C-81B2-C14D-B68B-B2195C4C0AFE}"/>
               </a:ext>
             </a:extLst>
           </p:cNvPr>
@@ -4751,76 +5340,83 @@
           <a:bodyPr/>
           <a:lstStyle/>
           <a:p>
-            <a:pPr algn="ctr"/>
             <a:r>
               <a:rPr lang="en-US" dirty="0"/>
-              <a:t>Overall Crime Rate was flat</a:t>
-            </a:r>
-          </a:p>
-        </p:txBody>
-      </p:sp>
-      <p:pic>
-        <p:nvPicPr>
-          <p:cNvPr id="7" name="Content Placeholder 6" descr="Chart, bar chart&#10;&#10;Description automatically generated">
-            <a:extLst>
-              <a:ext uri="{FF2B5EF4-FFF2-40B4-BE49-F238E27FC236}">
-                <a16:creationId xmlns:a16="http://schemas.microsoft.com/office/drawing/2014/main" id="{F15B66A2-1757-EE4F-A070-143998284D15}"/>
-              </a:ext>
-            </a:extLst>
-          </p:cNvPr>
-          <p:cNvPicPr>
-            <a:picLocks noGrp="1" noChangeAspect="1"/>
-          </p:cNvPicPr>
-          <p:nvPr>
-            <p:ph sz="half" idx="1"/>
-          </p:nvPr>
-        </p:nvPicPr>
-        <p:blipFill>
-          <a:blip r:embed="rId2"/>
-          <a:stretch>
-            <a:fillRect/>
-          </a:stretch>
-        </p:blipFill>
-        <p:spPr>
-          <a:xfrm>
-            <a:off x="838200" y="2274094"/>
-            <a:ext cx="5181600" cy="3454400"/>
-          </a:xfrm>
-        </p:spPr>
-      </p:pic>
-      <p:pic>
-        <p:nvPicPr>
-          <p:cNvPr id="4" name="Content Placeholder 3" descr="Chart, bar chart&#10;&#10;Description automatically generated">
-            <a:extLst>
-              <a:ext uri="{FF2B5EF4-FFF2-40B4-BE49-F238E27FC236}">
-                <a16:creationId xmlns:a16="http://schemas.microsoft.com/office/drawing/2014/main" id="{1AE8F124-5291-CE42-A266-ED3CBD17261C}"/>
-              </a:ext>
-            </a:extLst>
-          </p:cNvPr>
-          <p:cNvPicPr>
-            <a:picLocks noGrp="1" noChangeAspect="1"/>
-          </p:cNvPicPr>
-          <p:nvPr>
-            <p:ph sz="half" idx="2"/>
-          </p:nvPr>
-        </p:nvPicPr>
-        <p:blipFill>
-          <a:blip r:embed="rId3"/>
-          <a:stretch>
-            <a:fillRect/>
-          </a:stretch>
-        </p:blipFill>
-        <p:spPr>
-          <a:xfrm>
-            <a:off x="6172200" y="2274094"/>
-            <a:ext cx="5181600" cy="3454400"/>
-          </a:xfrm>
-        </p:spPr>
-      </p:pic>
+              <a:t>Questions</a:t>
+            </a:r>
+          </a:p>
+        </p:txBody>
+      </p:sp>
+      <p:sp>
+        <p:nvSpPr>
+          <p:cNvPr id="3" name="Content Placeholder 2">
+            <a:extLst>
+              <a:ext uri="{FF2B5EF4-FFF2-40B4-BE49-F238E27FC236}">
+                <a16:creationId xmlns:a16="http://schemas.microsoft.com/office/drawing/2014/main" id="{20915F77-71B6-6049-826B-9DE3D942E07F}"/>
+              </a:ext>
+            </a:extLst>
+          </p:cNvPr>
+          <p:cNvSpPr>
+            <a:spLocks noGrp="1"/>
+          </p:cNvSpPr>
+          <p:nvPr>
+            <p:ph idx="1"/>
+          </p:nvPr>
+        </p:nvSpPr>
+        <p:spPr/>
+        <p:txBody>
+          <a:bodyPr>
+            <a:normAutofit fontScale="92500" lnSpcReduction="10000"/>
+          </a:bodyPr>
+          <a:lstStyle/>
+          <a:p>
+            <a:r>
+              <a:rPr lang="en-US" dirty="0"/>
+              <a:t>What are the overall crime rate trends in Sacramento County and Oak Park in particular?</a:t>
+            </a:r>
+          </a:p>
+          <a:p>
+            <a:r>
+              <a:rPr lang="en-US" dirty="0"/>
+              <a:t>What are the crime rates for Oak Park for 2014-2018?</a:t>
+            </a:r>
+          </a:p>
+          <a:p>
+            <a:r>
+              <a:rPr lang="en-US" dirty="0"/>
+              <a:t>How would a heat map of the crime rate for each zip code in Sacramento County appear?</a:t>
+            </a:r>
+          </a:p>
+          <a:p>
+            <a:r>
+              <a:rPr lang="en-US" dirty="0"/>
+              <a:t>How would a heat map of the poverty rate for each zip code in Sacramento County appear?</a:t>
+            </a:r>
+          </a:p>
+          <a:p>
+            <a:r>
+              <a:rPr lang="en-US" dirty="0"/>
+              <a:t>What is  the crime rate versus the poverty rate for Sacramento County for 2014-2018?</a:t>
+            </a:r>
+          </a:p>
+          <a:p>
+            <a:r>
+              <a:rPr lang="en-US" dirty="0"/>
+              <a:t>Is there a correlation between the poverty rate and the crime rate?</a:t>
+            </a:r>
+          </a:p>
+          <a:p>
+            <a:r>
+              <a:rPr lang="en-US" dirty="0"/>
+              <a:t>Is there a correlation between home prices and the crime rate?</a:t>
+            </a:r>
+          </a:p>
+        </p:txBody>
+      </p:sp>
     </p:spTree>
     <p:extLst>
       <p:ext uri="{BB962C8B-B14F-4D97-AF65-F5344CB8AC3E}">
-        <p14:creationId xmlns:p14="http://schemas.microsoft.com/office/powerpoint/2010/main" val="2278268001"/>
+        <p14:creationId xmlns:p14="http://schemas.microsoft.com/office/powerpoint/2010/main" val="342459698"/>
       </p:ext>
     </p:extLst>
   </p:cSld>
@@ -4852,7 +5448,7 @@
           <p:cNvPr id="2" name="Title 1">
             <a:extLst>
               <a:ext uri="{FF2B5EF4-FFF2-40B4-BE49-F238E27FC236}">
-                <a16:creationId xmlns:a16="http://schemas.microsoft.com/office/drawing/2014/main" id="{8F4344C0-0B3B-B244-82D4-A5BA890AA477}"/>
+                <a16:creationId xmlns:a16="http://schemas.microsoft.com/office/drawing/2014/main" id="{6434A0BD-B447-874F-840E-9393F0A760BA}"/>
               </a:ext>
             </a:extLst>
           </p:cNvPr>
@@ -4871,7 +5467,7 @@
             <a:pPr algn="ctr"/>
             <a:r>
               <a:rPr lang="en-US" dirty="0"/>
-              <a:t>A heat map of the crime rates reflects the same trend</a:t>
+              <a:t>Overall Poverty Rate was flat</a:t>
             </a:r>
           </a:p>
         </p:txBody>
@@ -4881,7 +5477,7 @@
           <p:cNvPr id="6" name="Content Placeholder 5" descr="Map&#10;&#10;Description automatically generated">
             <a:extLst>
               <a:ext uri="{FF2B5EF4-FFF2-40B4-BE49-F238E27FC236}">
-                <a16:creationId xmlns:a16="http://schemas.microsoft.com/office/drawing/2014/main" id="{13804F86-FB8E-794B-85F9-8F8135423EBD}"/>
+                <a16:creationId xmlns:a16="http://schemas.microsoft.com/office/drawing/2014/main" id="{489F57F8-106E-9B4F-8875-1070890E444C}"/>
               </a:ext>
             </a:extLst>
           </p:cNvPr>
@@ -4900,17 +5496,17 @@
         </p:blipFill>
         <p:spPr>
           <a:xfrm>
-            <a:off x="1670050" y="2534444"/>
-            <a:ext cx="3517900" cy="2933700"/>
+            <a:off x="1027289" y="2534444"/>
+            <a:ext cx="4249562" cy="2933700"/>
           </a:xfrm>
         </p:spPr>
       </p:pic>
       <p:pic>
         <p:nvPicPr>
-          <p:cNvPr id="8" name="Content Placeholder 7" descr="Map&#10;&#10;Description automatically generated">
-            <a:extLst>
-              <a:ext uri="{FF2B5EF4-FFF2-40B4-BE49-F238E27FC236}">
-                <a16:creationId xmlns:a16="http://schemas.microsoft.com/office/drawing/2014/main" id="{FA8C7C05-E969-4347-BB79-BBF36C2C7E37}"/>
+          <p:cNvPr id="8" name="Content Placeholder 7">
+            <a:extLst>
+              <a:ext uri="{FF2B5EF4-FFF2-40B4-BE49-F238E27FC236}">
+                <a16:creationId xmlns:a16="http://schemas.microsoft.com/office/drawing/2014/main" id="{3E56AA57-BE20-3E43-B914-E664F90F28B3}"/>
               </a:ext>
             </a:extLst>
           </p:cNvPr>
@@ -4929,17 +5525,17 @@
         </p:blipFill>
         <p:spPr>
           <a:xfrm>
-            <a:off x="6908800" y="2528094"/>
-            <a:ext cx="3708400" cy="2946400"/>
+            <a:off x="6491111" y="2528094"/>
+            <a:ext cx="4357511" cy="2946400"/>
           </a:xfrm>
         </p:spPr>
       </p:pic>
       <p:sp>
         <p:nvSpPr>
-          <p:cNvPr id="9" name="TextBox 8">
-            <a:extLst>
-              <a:ext uri="{FF2B5EF4-FFF2-40B4-BE49-F238E27FC236}">
-                <a16:creationId xmlns:a16="http://schemas.microsoft.com/office/drawing/2014/main" id="{A7C4F9BA-2BEF-ED44-ADC2-4D6B05EA71EE}"/>
+          <p:cNvPr id="10" name="TextBox 9">
+            <a:extLst>
+              <a:ext uri="{FF2B5EF4-FFF2-40B4-BE49-F238E27FC236}">
+                <a16:creationId xmlns:a16="http://schemas.microsoft.com/office/drawing/2014/main" id="{B8C2ABB4-1808-2348-9921-AD5EA0519776}"/>
               </a:ext>
             </a:extLst>
           </p:cNvPr>
@@ -4948,8 +5544,8 @@
         </p:nvSpPr>
         <p:spPr>
           <a:xfrm>
-            <a:off x="2900856" y="2175641"/>
-            <a:ext cx="710248" cy="369332"/>
+            <a:off x="2958262" y="2019318"/>
+            <a:ext cx="751890" cy="369332"/>
           </a:xfrm>
           <a:prstGeom prst="rect">
             <a:avLst/>
@@ -4962,6 +5558,7 @@
           </a:bodyPr>
           <a:lstStyle/>
           <a:p>
+            <a:pPr algn="ctr"/>
             <a:r>
               <a:rPr lang="en-US" dirty="0"/>
               <a:t>2014</a:t>
@@ -4971,10 +5568,10 @@
       </p:sp>
       <p:sp>
         <p:nvSpPr>
-          <p:cNvPr id="10" name="TextBox 9">
-            <a:extLst>
-              <a:ext uri="{FF2B5EF4-FFF2-40B4-BE49-F238E27FC236}">
-                <a16:creationId xmlns:a16="http://schemas.microsoft.com/office/drawing/2014/main" id="{96CC2537-573E-B943-8BC9-AEC11C2DF258}"/>
+          <p:cNvPr id="11" name="TextBox 10">
+            <a:extLst>
+              <a:ext uri="{FF2B5EF4-FFF2-40B4-BE49-F238E27FC236}">
+                <a16:creationId xmlns:a16="http://schemas.microsoft.com/office/drawing/2014/main" id="{D781E60D-F8CC-124D-BB96-A872F867B5D5}"/>
               </a:ext>
             </a:extLst>
           </p:cNvPr>
@@ -4983,8 +5580,8 @@
         </p:nvSpPr>
         <p:spPr>
           <a:xfrm>
-            <a:off x="8485646" y="2158762"/>
-            <a:ext cx="805498" cy="369332"/>
+            <a:off x="8389483" y="2019318"/>
+            <a:ext cx="751889" cy="369332"/>
           </a:xfrm>
           <a:prstGeom prst="rect">
             <a:avLst/>
@@ -5007,7 +5604,7 @@
     </p:spTree>
     <p:extLst>
       <p:ext uri="{BB962C8B-B14F-4D97-AF65-F5344CB8AC3E}">
-        <p14:creationId xmlns:p14="http://schemas.microsoft.com/office/powerpoint/2010/main" val="1175564477"/>
+        <p14:creationId xmlns:p14="http://schemas.microsoft.com/office/powerpoint/2010/main" val="3157523059"/>
       </p:ext>
     </p:extLst>
   </p:cSld>
@@ -5039,7 +5636,7 @@
           <p:cNvPr id="2" name="Title 1">
             <a:extLst>
               <a:ext uri="{FF2B5EF4-FFF2-40B4-BE49-F238E27FC236}">
-                <a16:creationId xmlns:a16="http://schemas.microsoft.com/office/drawing/2014/main" id="{01C8E1F2-0055-FD49-804A-DD484BE3E1C0}"/>
+                <a16:creationId xmlns:a16="http://schemas.microsoft.com/office/drawing/2014/main" id="{8E9CDD85-B6A4-624A-B06F-2F4A29CAE38B}"/>
               </a:ext>
             </a:extLst>
           </p:cNvPr>
@@ -5058,17 +5655,17 @@
             <a:pPr algn="ctr"/>
             <a:r>
               <a:rPr lang="en-US" dirty="0"/>
-              <a:t>An outlier in the data was identified, additional analysis confirmed it</a:t>
+              <a:t>Overall Crime Rate was flat</a:t>
             </a:r>
           </a:p>
         </p:txBody>
       </p:sp>
       <p:pic>
         <p:nvPicPr>
-          <p:cNvPr id="6" name="Content Placeholder 5" descr="Chart, box and whisker chart&#10;&#10;Description automatically generated">
-            <a:extLst>
-              <a:ext uri="{FF2B5EF4-FFF2-40B4-BE49-F238E27FC236}">
-                <a16:creationId xmlns:a16="http://schemas.microsoft.com/office/drawing/2014/main" id="{6F4B9DB2-01AB-1A4E-9E0A-A0B527B1DEAB}"/>
+          <p:cNvPr id="7" name="Content Placeholder 6" descr="Chart, bar chart&#10;&#10;Description automatically generated">
+            <a:extLst>
+              <a:ext uri="{FF2B5EF4-FFF2-40B4-BE49-F238E27FC236}">
+                <a16:creationId xmlns:a16="http://schemas.microsoft.com/office/drawing/2014/main" id="{F15B66A2-1757-EE4F-A070-143998284D15}"/>
               </a:ext>
             </a:extLst>
           </p:cNvPr>
@@ -5094,10 +5691,10 @@
       </p:pic>
       <p:pic>
         <p:nvPicPr>
-          <p:cNvPr id="8" name="Content Placeholder 7" descr="Chart&#10;&#10;Description automatically generated">
-            <a:extLst>
-              <a:ext uri="{FF2B5EF4-FFF2-40B4-BE49-F238E27FC236}">
-                <a16:creationId xmlns:a16="http://schemas.microsoft.com/office/drawing/2014/main" id="{3748B96D-1DE4-504B-ADD6-E9E08005F6F6}"/>
+          <p:cNvPr id="4" name="Content Placeholder 3" descr="Chart, bar chart&#10;&#10;Description automatically generated">
+            <a:extLst>
+              <a:ext uri="{FF2B5EF4-FFF2-40B4-BE49-F238E27FC236}">
+                <a16:creationId xmlns:a16="http://schemas.microsoft.com/office/drawing/2014/main" id="{1AE8F124-5291-CE42-A266-ED3CBD17261C}"/>
               </a:ext>
             </a:extLst>
           </p:cNvPr>
@@ -5116,51 +5713,15 @@
         </p:blipFill>
         <p:spPr>
           <a:xfrm>
-            <a:off x="6172200" y="2364828"/>
-            <a:ext cx="5181600" cy="3258206"/>
+            <a:off x="6172200" y="2274094"/>
+            <a:ext cx="5181600" cy="3454400"/>
           </a:xfrm>
         </p:spPr>
       </p:pic>
-      <p:sp>
-        <p:nvSpPr>
-          <p:cNvPr id="9" name="TextBox 8">
-            <a:extLst>
-              <a:ext uri="{FF2B5EF4-FFF2-40B4-BE49-F238E27FC236}">
-                <a16:creationId xmlns:a16="http://schemas.microsoft.com/office/drawing/2014/main" id="{163B2049-67BD-B34D-8291-38417482DE9F}"/>
-              </a:ext>
-            </a:extLst>
-          </p:cNvPr>
-          <p:cNvSpPr txBox="1"/>
-          <p:nvPr/>
-        </p:nvSpPr>
-        <p:spPr>
-          <a:xfrm>
-            <a:off x="1481959" y="5728494"/>
-            <a:ext cx="9427779" cy="646331"/>
-          </a:xfrm>
-          <a:prstGeom prst="rect">
-            <a:avLst/>
-          </a:prstGeom>
-          <a:noFill/>
-        </p:spPr>
-        <p:txBody>
-          <a:bodyPr wrap="square" rtlCol="0">
-            <a:spAutoFit/>
-          </a:bodyPr>
-          <a:lstStyle/>
-          <a:p>
-            <a:pPr algn="ctr"/>
-            <a:r>
-              <a:rPr lang="en-US" dirty="0"/>
-              <a:t>The bar graph above clearly illustrates we have an outlier, 95837. The zip code was removed from further analysis as it threw off subsequent calculations.</a:t>
-            </a:r>
-          </a:p>
-        </p:txBody>
-      </p:sp>
     </p:spTree>
     <p:extLst>
       <p:ext uri="{BB962C8B-B14F-4D97-AF65-F5344CB8AC3E}">
-        <p14:creationId xmlns:p14="http://schemas.microsoft.com/office/powerpoint/2010/main" val="938042992"/>
+        <p14:creationId xmlns:p14="http://schemas.microsoft.com/office/powerpoint/2010/main" val="2278268001"/>
       </p:ext>
     </p:extLst>
   </p:cSld>

</xml_diff>